<commit_message>
"O.S Audit in M&A " Trans, Sec 5.3 done.
</commit_message>
<xml_diff>
--- a/misc/Figures_M&A_paper_JP.pptx
+++ b/misc/Figures_M&A_paper_JP.pptx
@@ -5,10 +5,10 @@
     <p:sldMasterId id="2147483659" r:id="rId1"/>
   </p:sldMasterIdLst>
   <p:notesMasterIdLst>
-    <p:notesMasterId r:id="rId14"/>
+    <p:notesMasterId r:id="rId15"/>
   </p:notesMasterIdLst>
   <p:handoutMasterIdLst>
-    <p:handoutMasterId r:id="rId15"/>
+    <p:handoutMasterId r:id="rId16"/>
   </p:handoutMasterIdLst>
   <p:sldIdLst>
     <p:sldId id="538" r:id="rId2"/>
@@ -23,6 +23,7 @@
     <p:sldId id="529" r:id="rId11"/>
     <p:sldId id="540" r:id="rId12"/>
     <p:sldId id="530" r:id="rId13"/>
+    <p:sldId id="542" r:id="rId14"/>
   </p:sldIdLst>
   <p:sldSz cx="12192000" cy="6858000"/>
   <p:notesSz cx="6858000" cy="9144000"/>
@@ -123,7 +124,7 @@
   </p:defaultTextStyle>
   <p:extLst>
     <p:ext uri="{EFAFB233-063F-42B5-8137-9DF3F51BA10A}">
-      <p15:sldGuideLst xmlns:p15="http://schemas.microsoft.com/office/powerpoint/2012/main" xmlns="">
+      <p15:sldGuideLst xmlns="" xmlns:p15="http://schemas.microsoft.com/office/powerpoint/2012/main">
         <p15:guide id="1" orient="horz" pos="2296" userDrawn="1">
           <p15:clr>
             <a:srgbClr val="A4A3A4"/>
@@ -137,7 +138,7 @@
       </p15:sldGuideLst>
     </p:ext>
     <p:ext uri="{2D200454-40CA-4A62-9FC3-DE9A4176ACB9}">
-      <p15:notesGuideLst xmlns:p15="http://schemas.microsoft.com/office/powerpoint/2012/main" xmlns=""/>
+      <p15:notesGuideLst xmlns="" xmlns:p15="http://schemas.microsoft.com/office/powerpoint/2012/main"/>
     </p:ext>
   </p:extLst>
 </p:presentation>
@@ -225,7 +226,7 @@
           <a:p>
             <a:fld id="{E6FDABA1-4B5D-4D1A-B9E0-E772E7058171}" type="datetimeFigureOut">
               <a:rPr lang="sv-SE" smtClean="0"/>
-              <a:t>2017-11-18</a:t>
+              <a:t>2017-11-19</a:t>
             </a:fld>
             <a:endParaRPr lang="sv-SE"/>
           </a:p>
@@ -390,7 +391,7 @@
           <a:p>
             <a:fld id="{DE46D2F7-F797-442B-A22D-84CBF0D5BA4F}" type="datetimeFigureOut">
               <a:rPr lang="sv-SE" smtClean="0"/>
-              <a:t>2017-11-18</a:t>
+              <a:t>2017-11-19</a:t>
             </a:fld>
             <a:endParaRPr lang="sv-SE"/>
           </a:p>
@@ -1881,6 +1882,96 @@
 </p:notes>
 </file>
 
+<file path=ppt/notesSlides/notesSlide9.xml><?xml version="1.0" encoding="utf-8"?>
+<p:notes xmlns:a="http://schemas.openxmlformats.org/drawingml/2006/main" xmlns:r="http://schemas.openxmlformats.org/officeDocument/2006/relationships" xmlns:p="http://schemas.openxmlformats.org/presentationml/2006/main">
+  <p:cSld>
+    <p:spTree>
+      <p:nvGrpSpPr>
+        <p:cNvPr id="1" name=""/>
+        <p:cNvGrpSpPr/>
+        <p:nvPr/>
+      </p:nvGrpSpPr>
+      <p:grpSpPr>
+        <a:xfrm>
+          <a:off x="0" y="0"/>
+          <a:ext cx="0" cy="0"/>
+          <a:chOff x="0" y="0"/>
+          <a:chExt cx="0" cy="0"/>
+        </a:xfrm>
+      </p:grpSpPr>
+      <p:sp>
+        <p:nvSpPr>
+          <p:cNvPr id="2" name="Slide Image Placeholder 1"/>
+          <p:cNvSpPr>
+            <a:spLocks noGrp="1" noRot="1" noChangeAspect="1"/>
+          </p:cNvSpPr>
+          <p:nvPr>
+            <p:ph type="sldImg"/>
+          </p:nvPr>
+        </p:nvSpPr>
+        <p:spPr/>
+      </p:sp>
+      <p:sp>
+        <p:nvSpPr>
+          <p:cNvPr id="3" name="Notes Placeholder 2"/>
+          <p:cNvSpPr>
+            <a:spLocks noGrp="1"/>
+          </p:cNvSpPr>
+          <p:nvPr>
+            <p:ph type="body" idx="1"/>
+          </p:nvPr>
+        </p:nvSpPr>
+        <p:spPr/>
+        <p:txBody>
+          <a:bodyPr/>
+          <a:lstStyle/>
+          <a:p>
+            <a:r>
+              <a:rPr lang="en-US" dirty="0"/>
+              <a:t>http://www.flaticon.com/packs/management-2</a:t>
+            </a:r>
+          </a:p>
+          <a:p>
+            <a:endParaRPr lang="en-US" dirty="0"/>
+          </a:p>
+        </p:txBody>
+      </p:sp>
+      <p:sp>
+        <p:nvSpPr>
+          <p:cNvPr id="4" name="Slide Number Placeholder 3"/>
+          <p:cNvSpPr>
+            <a:spLocks noGrp="1"/>
+          </p:cNvSpPr>
+          <p:nvPr>
+            <p:ph type="sldNum" sz="quarter" idx="10"/>
+          </p:nvPr>
+        </p:nvSpPr>
+        <p:spPr/>
+        <p:txBody>
+          <a:bodyPr/>
+          <a:lstStyle/>
+          <a:p>
+            <a:fld id="{89949FCC-B783-48EB-A7FB-879B9C32ECE4}" type="slidenum">
+              <a:rPr lang="sv-SE" smtClean="0"/>
+              <a:t>13</a:t>
+            </a:fld>
+            <a:endParaRPr lang="sv-SE"/>
+          </a:p>
+        </p:txBody>
+      </p:sp>
+    </p:spTree>
+    <p:extLst>
+      <p:ext uri="{BB962C8B-B14F-4D97-AF65-F5344CB8AC3E}">
+        <p14:creationId xmlns:p14="http://schemas.microsoft.com/office/powerpoint/2010/main" val="3844812179"/>
+      </p:ext>
+    </p:extLst>
+  </p:cSld>
+  <p:clrMapOvr>
+    <a:masterClrMapping/>
+  </p:clrMapOvr>
+</p:notes>
+</file>
+
 <file path=ppt/slideLayouts/slideLayout1.xml><?xml version="1.0" encoding="utf-8"?>
 <p:sldLayout xmlns:a="http://schemas.openxmlformats.org/drawingml/2006/main" xmlns:r="http://schemas.openxmlformats.org/officeDocument/2006/relationships" xmlns:p="http://schemas.openxmlformats.org/presentationml/2006/main" type="title" preserve="1">
   <p:cSld name="Title Slide">
@@ -2012,7 +2103,7 @@
           <a:p>
             <a:fld id="{644446D9-CA4E-47F7-ADA0-1C514647DC66}" type="datetimeFigureOut">
               <a:rPr lang="en-US" smtClean="0"/>
-              <a:t>11/18/2017</a:t>
+              <a:t>11/19/2017</a:t>
             </a:fld>
             <a:endParaRPr lang="en-US"/>
           </a:p>
@@ -2182,7 +2273,7 @@
           <a:p>
             <a:fld id="{644446D9-CA4E-47F7-ADA0-1C514647DC66}" type="datetimeFigureOut">
               <a:rPr lang="en-US" smtClean="0"/>
-              <a:t>11/18/2017</a:t>
+              <a:t>11/19/2017</a:t>
             </a:fld>
             <a:endParaRPr lang="en-US"/>
           </a:p>
@@ -2362,7 +2453,7 @@
           <a:p>
             <a:fld id="{644446D9-CA4E-47F7-ADA0-1C514647DC66}" type="datetimeFigureOut">
               <a:rPr lang="en-US" smtClean="0"/>
-              <a:t>11/18/2017</a:t>
+              <a:t>11/19/2017</a:t>
             </a:fld>
             <a:endParaRPr lang="en-US"/>
           </a:p>
@@ -2532,7 +2623,7 @@
           <a:p>
             <a:fld id="{644446D9-CA4E-47F7-ADA0-1C514647DC66}" type="datetimeFigureOut">
               <a:rPr lang="en-US" smtClean="0"/>
-              <a:t>11/18/2017</a:t>
+              <a:t>11/19/2017</a:t>
             </a:fld>
             <a:endParaRPr lang="en-US"/>
           </a:p>
@@ -2778,7 +2869,7 @@
           <a:p>
             <a:fld id="{644446D9-CA4E-47F7-ADA0-1C514647DC66}" type="datetimeFigureOut">
               <a:rPr lang="en-US" smtClean="0"/>
-              <a:t>11/18/2017</a:t>
+              <a:t>11/19/2017</a:t>
             </a:fld>
             <a:endParaRPr lang="en-US"/>
           </a:p>
@@ -3010,7 +3101,7 @@
           <a:p>
             <a:fld id="{644446D9-CA4E-47F7-ADA0-1C514647DC66}" type="datetimeFigureOut">
               <a:rPr lang="en-US" smtClean="0"/>
-              <a:t>11/18/2017</a:t>
+              <a:t>11/19/2017</a:t>
             </a:fld>
             <a:endParaRPr lang="en-US"/>
           </a:p>
@@ -3377,7 +3468,7 @@
           <a:p>
             <a:fld id="{644446D9-CA4E-47F7-ADA0-1C514647DC66}" type="datetimeFigureOut">
               <a:rPr lang="en-US" smtClean="0"/>
-              <a:t>11/18/2017</a:t>
+              <a:t>11/19/2017</a:t>
             </a:fld>
             <a:endParaRPr lang="en-US"/>
           </a:p>
@@ -3495,7 +3586,7 @@
           <a:p>
             <a:fld id="{644446D9-CA4E-47F7-ADA0-1C514647DC66}" type="datetimeFigureOut">
               <a:rPr lang="en-US" smtClean="0"/>
-              <a:t>11/18/2017</a:t>
+              <a:t>11/19/2017</a:t>
             </a:fld>
             <a:endParaRPr lang="en-US"/>
           </a:p>
@@ -3590,7 +3681,7 @@
           <a:p>
             <a:fld id="{644446D9-CA4E-47F7-ADA0-1C514647DC66}" type="datetimeFigureOut">
               <a:rPr lang="en-US" smtClean="0"/>
-              <a:t>11/18/2017</a:t>
+              <a:t>11/19/2017</a:t>
             </a:fld>
             <a:endParaRPr lang="en-US"/>
           </a:p>
@@ -3867,7 +3958,7 @@
           <a:p>
             <a:fld id="{644446D9-CA4E-47F7-ADA0-1C514647DC66}" type="datetimeFigureOut">
               <a:rPr lang="en-US" smtClean="0"/>
-              <a:t>11/18/2017</a:t>
+              <a:t>11/19/2017</a:t>
             </a:fld>
             <a:endParaRPr lang="en-US"/>
           </a:p>
@@ -4120,7 +4211,7 @@
           <a:p>
             <a:fld id="{644446D9-CA4E-47F7-ADA0-1C514647DC66}" type="datetimeFigureOut">
               <a:rPr lang="en-US" smtClean="0"/>
-              <a:t>11/18/2017</a:t>
+              <a:t>11/19/2017</a:t>
             </a:fld>
             <a:endParaRPr lang="en-US"/>
           </a:p>
@@ -4333,7 +4424,7 @@
           <a:p>
             <a:fld id="{644446D9-CA4E-47F7-ADA0-1C514647DC66}" type="datetimeFigureOut">
               <a:rPr lang="en-US" smtClean="0"/>
-              <a:t>11/18/2017</a:t>
+              <a:t>11/19/2017</a:t>
             </a:fld>
             <a:endParaRPr lang="en-US"/>
           </a:p>
@@ -4885,7 +4976,7 @@
         </p:nvSpPr>
         <p:spPr>
           <a:xfrm>
-            <a:off x="8794078" y="1125365"/>
+            <a:off x="8794078" y="1113490"/>
             <a:ext cx="588397" cy="633889"/>
           </a:xfrm>
           <a:prstGeom prst="arc">
@@ -4925,15 +5016,13 @@
           <p:cNvPr id="15" name="Straight Connector 14"/>
           <p:cNvCxnSpPr>
             <a:cxnSpLocks/>
-            <a:stCxn id="2" idx="0"/>
-            <a:endCxn id="47" idx="3"/>
           </p:cNvCxnSpPr>
           <p:nvPr/>
         </p:nvCxnSpPr>
         <p:spPr>
           <a:xfrm flipH="1" flipV="1">
-            <a:off x="3613175" y="1109261"/>
-            <a:ext cx="5475101" cy="16104"/>
+            <a:off x="3613175" y="1121136"/>
+            <a:ext cx="5475101" cy="0"/>
           </a:xfrm>
           <a:prstGeom prst="line">
             <a:avLst/>
@@ -5128,7 +5217,7 @@
         </p:nvSpPr>
         <p:spPr>
           <a:xfrm rot="10800000">
-            <a:off x="1302078" y="4639486"/>
+            <a:off x="1302078" y="4651361"/>
             <a:ext cx="588397" cy="633889"/>
           </a:xfrm>
           <a:prstGeom prst="arc">
@@ -5173,8 +5262,8 @@
         </p:nvCxnSpPr>
         <p:spPr>
           <a:xfrm flipH="1">
-            <a:off x="1596276" y="5271701"/>
-            <a:ext cx="7806411" cy="1675"/>
+            <a:off x="1596276" y="5283576"/>
+            <a:ext cx="7806411" cy="0"/>
           </a:xfrm>
           <a:prstGeom prst="line">
             <a:avLst/>
@@ -5211,7 +5300,7 @@
         </p:nvCxnSpPr>
         <p:spPr>
           <a:xfrm>
-            <a:off x="1302077" y="3469394"/>
+            <a:off x="1302077" y="3481269"/>
             <a:ext cx="1" cy="1487036"/>
           </a:xfrm>
           <a:prstGeom prst="line">
@@ -6664,7 +6753,7 @@
         </p:nvSpPr>
         <p:spPr>
           <a:xfrm>
-            <a:off x="8794078" y="1125365"/>
+            <a:off x="8794078" y="1113490"/>
             <a:ext cx="588397" cy="633889"/>
           </a:xfrm>
           <a:prstGeom prst="arc">
@@ -6704,15 +6793,13 @@
           <p:cNvPr id="15" name="Straight Connector 14"/>
           <p:cNvCxnSpPr>
             <a:cxnSpLocks/>
-            <a:stCxn id="2" idx="0"/>
-            <a:endCxn id="47" idx="3"/>
           </p:cNvCxnSpPr>
           <p:nvPr/>
         </p:nvCxnSpPr>
         <p:spPr>
           <a:xfrm flipH="1" flipV="1">
-            <a:off x="3613175" y="1109261"/>
-            <a:ext cx="5475101" cy="16104"/>
+            <a:off x="3613175" y="1121136"/>
+            <a:ext cx="5475101" cy="0"/>
           </a:xfrm>
           <a:prstGeom prst="line">
             <a:avLst/>
@@ -6953,7 +7040,7 @@
         <p:spPr>
           <a:xfrm flipH="1">
             <a:off x="1596276" y="5271701"/>
-            <a:ext cx="7806411" cy="1675"/>
+            <a:ext cx="7806411" cy="0"/>
           </a:xfrm>
           <a:prstGeom prst="line">
             <a:avLst/>
@@ -7115,7 +7202,7 @@
         </p:nvSpPr>
         <p:spPr>
           <a:xfrm>
-            <a:off x="3684335" y="1342275"/>
+            <a:off x="3684335" y="1377900"/>
             <a:ext cx="2485216" cy="600164"/>
           </a:xfrm>
           <a:prstGeom prst="rect">
@@ -7135,15 +7222,7 @@
                 <a:ea typeface="メイリオ" panose="020B0604030504040204" pitchFamily="50" charset="-128"/>
                 <a:cs typeface="メイリオ" panose="020B0604030504040204" pitchFamily="50" charset="-128"/>
               </a:rPr>
-              <a:t>プロジェクトをキックオフし、すべての関係組織の窓口担当</a:t>
-            </a:r>
-            <a:r>
-              <a:rPr lang="ja-JP" altLang="en-US" sz="1100" dirty="0" smtClean="0">
-                <a:latin typeface="メイリオ" panose="020B0604030504040204" pitchFamily="50" charset="-128"/>
-                <a:ea typeface="メイリオ" panose="020B0604030504040204" pitchFamily="50" charset="-128"/>
-                <a:cs typeface="メイリオ" panose="020B0604030504040204" pitchFamily="50" charset="-128"/>
-              </a:rPr>
-              <a:t>を紹介し換算に関する詳細情報を伝えます。</a:t>
+              <a:t>プロジェクトをキックオフし、すべての関係組織の窓口担当を紹介し換算に関する詳細情報を伝えます。</a:t>
             </a:r>
             <a:endParaRPr lang="sv-SE" sz="1100" dirty="0">
               <a:latin typeface="メイリオ" panose="020B0604030504040204" pitchFamily="50" charset="-128"/>
@@ -7161,7 +7240,7 @@
         </p:nvSpPr>
         <p:spPr>
           <a:xfrm>
-            <a:off x="3693883" y="1101355"/>
+            <a:off x="3693883" y="1136980"/>
             <a:ext cx="2397260" cy="276999"/>
           </a:xfrm>
           <a:prstGeom prst="rect">
@@ -7182,15 +7261,7 @@
                 <a:ea typeface="メイリオ" panose="020B0604030504040204" pitchFamily="50" charset="-128"/>
                 <a:cs typeface="メイリオ" panose="020B0604030504040204" pitchFamily="50" charset="-128"/>
               </a:rPr>
-              <a:t>立ち上げ時招集、</a:t>
-            </a:r>
-            <a:r>
-              <a:rPr lang="ja-JP" altLang="en-US" sz="1200" b="1" dirty="0" smtClean="0">
-                <a:latin typeface="メイリオ" panose="020B0604030504040204" pitchFamily="50" charset="-128"/>
-                <a:ea typeface="メイリオ" panose="020B0604030504040204" pitchFamily="50" charset="-128"/>
-                <a:cs typeface="メイリオ" panose="020B0604030504040204" pitchFamily="50" charset="-128"/>
-              </a:rPr>
-              <a:t>ミーティング</a:t>
+              <a:t>立ち上げ時招集、ミーティング</a:t>
             </a:r>
             <a:endParaRPr lang="sv-SE" sz="1200" b="1" dirty="0">
               <a:latin typeface="メイリオ" panose="020B0604030504040204" pitchFamily="50" charset="-128"/>
@@ -7208,7 +7279,7 @@
         </p:nvSpPr>
         <p:spPr>
           <a:xfrm>
-            <a:off x="6546039" y="1326556"/>
+            <a:off x="6546039" y="1362181"/>
             <a:ext cx="2712553" cy="784830"/>
           </a:xfrm>
           <a:prstGeom prst="rect">
@@ -7269,7 +7340,7 @@
         </p:nvSpPr>
         <p:spPr>
           <a:xfrm>
-            <a:off x="6669642" y="1101355"/>
+            <a:off x="6669642" y="1136980"/>
             <a:ext cx="2397260" cy="276999"/>
           </a:xfrm>
           <a:prstGeom prst="rect">
@@ -7308,7 +7379,7 @@
         </p:nvSpPr>
         <p:spPr>
           <a:xfrm>
-            <a:off x="1474789" y="3453562"/>
+            <a:off x="1474789" y="3477312"/>
             <a:ext cx="2473462" cy="769441"/>
           </a:xfrm>
           <a:prstGeom prst="rect">
@@ -7373,7 +7444,7 @@
         </p:nvSpPr>
         <p:spPr>
           <a:xfrm>
-            <a:off x="1404889" y="3188951"/>
+            <a:off x="1404889" y="3212701"/>
             <a:ext cx="2397260" cy="276999"/>
           </a:xfrm>
           <a:prstGeom prst="rect">
@@ -7414,7 +7485,7 @@
         </p:nvSpPr>
         <p:spPr>
           <a:xfrm>
-            <a:off x="4213301" y="3448107"/>
+            <a:off x="4213301" y="3471857"/>
             <a:ext cx="2593264" cy="938719"/>
           </a:xfrm>
           <a:prstGeom prst="rect">
@@ -7467,7 +7538,7 @@
         </p:nvSpPr>
         <p:spPr>
           <a:xfrm>
-            <a:off x="4229032" y="3193739"/>
+            <a:off x="4229032" y="3217489"/>
             <a:ext cx="2397260" cy="276999"/>
           </a:xfrm>
           <a:prstGeom prst="rect">
@@ -7506,7 +7577,7 @@
         </p:nvSpPr>
         <p:spPr>
           <a:xfrm>
-            <a:off x="7177825" y="3447070"/>
+            <a:off x="7177825" y="3470820"/>
             <a:ext cx="2360073" cy="600164"/>
           </a:xfrm>
           <a:prstGeom prst="rect">
@@ -7563,7 +7634,7 @@
         </p:nvSpPr>
         <p:spPr>
           <a:xfrm>
-            <a:off x="7159232" y="3189419"/>
+            <a:off x="7159232" y="3213169"/>
             <a:ext cx="2397260" cy="276999"/>
           </a:xfrm>
           <a:prstGeom prst="rect">
@@ -7664,7 +7735,7 @@
         </p:nvSpPr>
         <p:spPr>
           <a:xfrm>
-            <a:off x="1384840" y="5477225"/>
+            <a:off x="1384840" y="5536599"/>
             <a:ext cx="2452993" cy="769441"/>
           </a:xfrm>
           <a:prstGeom prst="rect">
@@ -7713,7 +7784,7 @@
         </p:nvSpPr>
         <p:spPr>
           <a:xfrm>
-            <a:off x="1398481" y="5286990"/>
+            <a:off x="1398481" y="5310740"/>
             <a:ext cx="2397260" cy="276999"/>
           </a:xfrm>
           <a:prstGeom prst="rect">
@@ -7754,7 +7825,7 @@
         </p:nvSpPr>
         <p:spPr>
           <a:xfrm>
-            <a:off x="7236098" y="5477224"/>
+            <a:off x="7236098" y="5536599"/>
             <a:ext cx="2277107" cy="769441"/>
           </a:xfrm>
           <a:prstGeom prst="rect">
@@ -7799,7 +7870,7 @@
         </p:nvSpPr>
         <p:spPr>
           <a:xfrm>
-            <a:off x="7507587" y="5303899"/>
+            <a:off x="7507587" y="5327649"/>
             <a:ext cx="1707022" cy="276999"/>
           </a:xfrm>
           <a:prstGeom prst="rect">
@@ -7904,7 +7975,7 @@
         </p:nvSpPr>
         <p:spPr>
           <a:xfrm>
-            <a:off x="4371940" y="5477225"/>
+            <a:off x="4371940" y="5536599"/>
             <a:ext cx="2527676" cy="969496"/>
           </a:xfrm>
           <a:prstGeom prst="rect">
@@ -7969,7 +8040,7 @@
         </p:nvSpPr>
         <p:spPr>
           <a:xfrm>
-            <a:off x="4317289" y="5286990"/>
+            <a:off x="4317289" y="5310740"/>
             <a:ext cx="2397260" cy="276999"/>
           </a:xfrm>
           <a:prstGeom prst="rect">
@@ -8848,7 +8919,7 @@
         </p:nvSpPr>
         <p:spPr>
           <a:xfrm rot="10800000">
-            <a:off x="1581879" y="4419938"/>
+            <a:off x="1581879" y="4431813"/>
             <a:ext cx="588397" cy="633889"/>
           </a:xfrm>
           <a:prstGeom prst="arc">
@@ -8893,8 +8964,8 @@
         </p:nvCxnSpPr>
         <p:spPr>
           <a:xfrm flipH="1" flipV="1">
-            <a:off x="1876077" y="5050448"/>
-            <a:ext cx="7789580" cy="33183"/>
+            <a:off x="1876077" y="5074198"/>
+            <a:ext cx="7789580" cy="0"/>
           </a:xfrm>
           <a:prstGeom prst="line">
             <a:avLst/>
@@ -9968,7 +10039,7 @@
         </p:nvSpPr>
         <p:spPr>
           <a:xfrm>
-            <a:off x="9164496" y="900178"/>
+            <a:off x="9164496" y="888303"/>
             <a:ext cx="588397" cy="633889"/>
           </a:xfrm>
           <a:prstGeom prst="arc">
@@ -10008,15 +10079,13 @@
           <p:cNvPr id="76" name="Straight Connector 75"/>
           <p:cNvCxnSpPr>
             <a:cxnSpLocks/>
-            <a:stCxn id="57" idx="0"/>
-            <a:endCxn id="92" idx="3"/>
           </p:cNvCxnSpPr>
           <p:nvPr/>
         </p:nvCxnSpPr>
         <p:spPr>
-          <a:xfrm flipH="1" flipV="1">
-            <a:off x="4050268" y="893599"/>
-            <a:ext cx="5408426" cy="6579"/>
+          <a:xfrm flipH="1">
+            <a:off x="4050268" y="888303"/>
+            <a:ext cx="5408426" cy="0"/>
           </a:xfrm>
           <a:prstGeom prst="line">
             <a:avLst/>
@@ -10486,6 +10555,2101 @@
 </p:sld>
 </file>
 
+<file path=ppt/slides/slide13.xml><?xml version="1.0" encoding="utf-8"?>
+<p:sld xmlns:a="http://schemas.openxmlformats.org/drawingml/2006/main" xmlns:r="http://schemas.openxmlformats.org/officeDocument/2006/relationships" xmlns:p="http://schemas.openxmlformats.org/presentationml/2006/main">
+  <p:cSld>
+    <p:spTree>
+      <p:nvGrpSpPr>
+        <p:cNvPr id="1" name=""/>
+        <p:cNvGrpSpPr/>
+        <p:nvPr/>
+      </p:nvGrpSpPr>
+      <p:grpSpPr>
+        <a:xfrm>
+          <a:off x="0" y="0"/>
+          <a:ext cx="0" cy="0"/>
+          <a:chOff x="0" y="0"/>
+          <a:chExt cx="0" cy="0"/>
+        </a:xfrm>
+      </p:grpSpPr>
+      <p:sp>
+        <p:nvSpPr>
+          <p:cNvPr id="95" name="Rectangle 94"/>
+          <p:cNvSpPr/>
+          <p:nvPr/>
+        </p:nvSpPr>
+        <p:spPr>
+          <a:xfrm>
+            <a:off x="1272047" y="156087"/>
+            <a:ext cx="9210675" cy="6451190"/>
+          </a:xfrm>
+          <a:prstGeom prst="rect">
+            <a:avLst/>
+          </a:prstGeom>
+          <a:noFill/>
+          <a:ln w="38100">
+            <a:solidFill>
+              <a:srgbClr val="2CA4F2"/>
+            </a:solidFill>
+          </a:ln>
+        </p:spPr>
+        <p:style>
+          <a:lnRef idx="2">
+            <a:schemeClr val="accent1">
+              <a:shade val="50000"/>
+            </a:schemeClr>
+          </a:lnRef>
+          <a:fillRef idx="1">
+            <a:schemeClr val="accent1"/>
+          </a:fillRef>
+          <a:effectRef idx="0">
+            <a:schemeClr val="accent1"/>
+          </a:effectRef>
+          <a:fontRef idx="minor">
+            <a:schemeClr val="lt1"/>
+          </a:fontRef>
+        </p:style>
+        <p:txBody>
+          <a:bodyPr rtlCol="0" anchor="ctr"/>
+          <a:lstStyle/>
+          <a:p>
+            <a:pPr algn="ctr"/>
+            <a:endParaRPr lang="en-US" sz="1400" b="1" i="1">
+              <a:solidFill>
+                <a:schemeClr val="tx1"/>
+              </a:solidFill>
+              <a:latin typeface="メイリオ" panose="020B0604030504040204" pitchFamily="50" charset="-128"/>
+              <a:ea typeface="メイリオ" panose="020B0604030504040204" pitchFamily="50" charset="-128"/>
+              <a:cs typeface="メイリオ" panose="020B0604030504040204" pitchFamily="50" charset="-128"/>
+            </a:endParaRPr>
+          </a:p>
+        </p:txBody>
+      </p:sp>
+      <p:cxnSp>
+        <p:nvCxnSpPr>
+          <p:cNvPr id="20" name="Straight Connector 19"/>
+          <p:cNvCxnSpPr>
+            <a:cxnSpLocks/>
+          </p:cNvCxnSpPr>
+          <p:nvPr/>
+        </p:nvCxnSpPr>
+        <p:spPr>
+          <a:xfrm>
+            <a:off x="9752893" y="1275479"/>
+            <a:ext cx="874" cy="1406716"/>
+          </a:xfrm>
+          <a:prstGeom prst="line">
+            <a:avLst/>
+          </a:prstGeom>
+          <a:ln w="19050">
+            <a:solidFill>
+              <a:schemeClr val="tx1"/>
+            </a:solidFill>
+          </a:ln>
+        </p:spPr>
+        <p:style>
+          <a:lnRef idx="1">
+            <a:schemeClr val="accent1"/>
+          </a:lnRef>
+          <a:fillRef idx="0">
+            <a:schemeClr val="accent1"/>
+          </a:fillRef>
+          <a:effectRef idx="0">
+            <a:schemeClr val="accent1"/>
+          </a:effectRef>
+          <a:fontRef idx="minor">
+            <a:schemeClr val="tx1"/>
+          </a:fontRef>
+        </p:style>
+      </p:cxnSp>
+      <p:sp>
+        <p:nvSpPr>
+          <p:cNvPr id="23" name="Arc 22"/>
+          <p:cNvSpPr/>
+          <p:nvPr/>
+        </p:nvSpPr>
+        <p:spPr>
+          <a:xfrm rot="5400000">
+            <a:off x="9142624" y="2362569"/>
+            <a:ext cx="588397" cy="633889"/>
+          </a:xfrm>
+          <a:prstGeom prst="arc">
+            <a:avLst/>
+          </a:prstGeom>
+          <a:ln w="19050">
+            <a:solidFill>
+              <a:schemeClr val="tx1"/>
+            </a:solidFill>
+          </a:ln>
+        </p:spPr>
+        <p:style>
+          <a:lnRef idx="1">
+            <a:schemeClr val="accent1"/>
+          </a:lnRef>
+          <a:fillRef idx="0">
+            <a:schemeClr val="accent1"/>
+          </a:fillRef>
+          <a:effectRef idx="0">
+            <a:schemeClr val="accent1"/>
+          </a:effectRef>
+          <a:fontRef idx="minor">
+            <a:schemeClr val="tx1"/>
+          </a:fontRef>
+        </p:style>
+        <p:txBody>
+          <a:bodyPr rtlCol="0" anchor="ctr"/>
+          <a:lstStyle/>
+          <a:p>
+            <a:pPr algn="ctr"/>
+            <a:endParaRPr lang="en-US"/>
+          </a:p>
+        </p:txBody>
+      </p:sp>
+      <p:cxnSp>
+        <p:nvCxnSpPr>
+          <p:cNvPr id="24" name="Straight Connector 23"/>
+          <p:cNvCxnSpPr>
+            <a:cxnSpLocks/>
+            <a:stCxn id="23" idx="2"/>
+            <a:endCxn id="26" idx="2"/>
+          </p:cNvCxnSpPr>
+          <p:nvPr/>
+        </p:nvCxnSpPr>
+        <p:spPr>
+          <a:xfrm flipH="1" flipV="1">
+            <a:off x="1898824" y="2973711"/>
+            <a:ext cx="7537998" cy="1"/>
+          </a:xfrm>
+          <a:prstGeom prst="line">
+            <a:avLst/>
+          </a:prstGeom>
+          <a:ln w="19050">
+            <a:solidFill>
+              <a:schemeClr val="tx1"/>
+            </a:solidFill>
+          </a:ln>
+        </p:spPr>
+        <p:style>
+          <a:lnRef idx="1">
+            <a:schemeClr val="accent1"/>
+          </a:lnRef>
+          <a:fillRef idx="0">
+            <a:schemeClr val="accent1"/>
+          </a:fillRef>
+          <a:effectRef idx="0">
+            <a:schemeClr val="accent1"/>
+          </a:effectRef>
+          <a:fontRef idx="minor">
+            <a:schemeClr val="tx1"/>
+          </a:fontRef>
+        </p:style>
+      </p:cxnSp>
+      <p:sp>
+        <p:nvSpPr>
+          <p:cNvPr id="26" name="Arc 25"/>
+          <p:cNvSpPr/>
+          <p:nvPr/>
+        </p:nvSpPr>
+        <p:spPr>
+          <a:xfrm rot="16200000">
+            <a:off x="1604625" y="2950965"/>
+            <a:ext cx="588397" cy="633889"/>
+          </a:xfrm>
+          <a:prstGeom prst="arc">
+            <a:avLst/>
+          </a:prstGeom>
+          <a:ln w="19050">
+            <a:solidFill>
+              <a:schemeClr val="tx1"/>
+            </a:solidFill>
+          </a:ln>
+        </p:spPr>
+        <p:style>
+          <a:lnRef idx="1">
+            <a:schemeClr val="accent1"/>
+          </a:lnRef>
+          <a:fillRef idx="0">
+            <a:schemeClr val="accent1"/>
+          </a:fillRef>
+          <a:effectRef idx="0">
+            <a:schemeClr val="accent1"/>
+          </a:effectRef>
+          <a:fontRef idx="minor">
+            <a:schemeClr val="tx1"/>
+          </a:fontRef>
+        </p:style>
+        <p:txBody>
+          <a:bodyPr rtlCol="0" anchor="ctr"/>
+          <a:lstStyle/>
+          <a:p>
+            <a:pPr algn="ctr"/>
+            <a:endParaRPr lang="en-US"/>
+          </a:p>
+        </p:txBody>
+      </p:sp>
+      <p:sp>
+        <p:nvSpPr>
+          <p:cNvPr id="29" name="Arc 28"/>
+          <p:cNvSpPr/>
+          <p:nvPr/>
+        </p:nvSpPr>
+        <p:spPr>
+          <a:xfrm rot="10800000">
+            <a:off x="1581879" y="4431813"/>
+            <a:ext cx="588397" cy="633889"/>
+          </a:xfrm>
+          <a:prstGeom prst="arc">
+            <a:avLst/>
+          </a:prstGeom>
+          <a:ln w="19050">
+            <a:solidFill>
+              <a:schemeClr val="tx1"/>
+            </a:solidFill>
+          </a:ln>
+        </p:spPr>
+        <p:style>
+          <a:lnRef idx="1">
+            <a:schemeClr val="accent1"/>
+          </a:lnRef>
+          <a:fillRef idx="0">
+            <a:schemeClr val="accent1"/>
+          </a:fillRef>
+          <a:effectRef idx="0">
+            <a:schemeClr val="accent1"/>
+          </a:effectRef>
+          <a:fontRef idx="minor">
+            <a:schemeClr val="tx1"/>
+          </a:fontRef>
+        </p:style>
+        <p:txBody>
+          <a:bodyPr rtlCol="0" anchor="ctr"/>
+          <a:lstStyle/>
+          <a:p>
+            <a:pPr algn="ctr"/>
+            <a:endParaRPr lang="en-US"/>
+          </a:p>
+        </p:txBody>
+      </p:sp>
+      <p:cxnSp>
+        <p:nvCxnSpPr>
+          <p:cNvPr id="34" name="Straight Connector 33"/>
+          <p:cNvCxnSpPr>
+            <a:cxnSpLocks/>
+          </p:cNvCxnSpPr>
+          <p:nvPr/>
+        </p:nvCxnSpPr>
+        <p:spPr>
+          <a:xfrm flipH="1" flipV="1">
+            <a:off x="1876077" y="5074198"/>
+            <a:ext cx="7789580" cy="0"/>
+          </a:xfrm>
+          <a:prstGeom prst="line">
+            <a:avLst/>
+          </a:prstGeom>
+          <a:ln w="19050">
+            <a:solidFill>
+              <a:schemeClr val="tx1"/>
+            </a:solidFill>
+          </a:ln>
+        </p:spPr>
+        <p:style>
+          <a:lnRef idx="1">
+            <a:schemeClr val="accent1"/>
+          </a:lnRef>
+          <a:fillRef idx="0">
+            <a:schemeClr val="accent1"/>
+          </a:fillRef>
+          <a:effectRef idx="0">
+            <a:schemeClr val="accent1"/>
+          </a:effectRef>
+          <a:fontRef idx="minor">
+            <a:schemeClr val="tx1"/>
+          </a:fontRef>
+        </p:style>
+      </p:cxnSp>
+      <p:cxnSp>
+        <p:nvCxnSpPr>
+          <p:cNvPr id="16" name="Straight Connector 15"/>
+          <p:cNvCxnSpPr>
+            <a:cxnSpLocks/>
+          </p:cNvCxnSpPr>
+          <p:nvPr/>
+        </p:nvCxnSpPr>
+        <p:spPr>
+          <a:xfrm>
+            <a:off x="1584692" y="3270166"/>
+            <a:ext cx="1" cy="1487036"/>
+          </a:xfrm>
+          <a:prstGeom prst="line">
+            <a:avLst/>
+          </a:prstGeom>
+          <a:ln w="19050">
+            <a:solidFill>
+              <a:schemeClr val="tx1"/>
+            </a:solidFill>
+          </a:ln>
+        </p:spPr>
+        <p:style>
+          <a:lnRef idx="1">
+            <a:schemeClr val="accent1"/>
+          </a:lnRef>
+          <a:fillRef idx="0">
+            <a:schemeClr val="accent1"/>
+          </a:fillRef>
+          <a:effectRef idx="0">
+            <a:schemeClr val="accent1"/>
+          </a:effectRef>
+          <a:fontRef idx="minor">
+            <a:schemeClr val="tx1"/>
+          </a:fontRef>
+        </p:style>
+      </p:cxnSp>
+      <p:sp>
+        <p:nvSpPr>
+          <p:cNvPr id="58" name="TextBox 57"/>
+          <p:cNvSpPr txBox="1"/>
+          <p:nvPr/>
+        </p:nvSpPr>
+        <p:spPr>
+          <a:xfrm>
+            <a:off x="2238567" y="3266396"/>
+            <a:ext cx="1947804" cy="769441"/>
+          </a:xfrm>
+          <a:prstGeom prst="rect">
+            <a:avLst/>
+          </a:prstGeom>
+          <a:noFill/>
+        </p:spPr>
+        <p:txBody>
+          <a:bodyPr wrap="square" rtlCol="0">
+            <a:spAutoFit/>
+          </a:bodyPr>
+          <a:lstStyle>
+            <a:defPPr>
+              <a:defRPr lang="sv-SE"/>
+            </a:defPPr>
+            <a:lvl1pPr>
+              <a:defRPr sz="1100">
+                <a:latin typeface="メイリオ" panose="020B0604030504040204" pitchFamily="50" charset="-128"/>
+                <a:ea typeface="メイリオ" panose="020B0604030504040204" pitchFamily="50" charset="-128"/>
+                <a:cs typeface="メイリオ" panose="020B0604030504040204" pitchFamily="50" charset="-128"/>
+              </a:defRPr>
+            </a:lvl1pPr>
+          </a:lstStyle>
+          <a:p>
+            <a:r>
+              <a:rPr lang="ja-JP" altLang="en-US" dirty="0" smtClean="0"/>
+              <a:t>対象企業が</a:t>
+            </a:r>
+            <a:r>
+              <a:rPr lang="en-US" altLang="ja-JP" dirty="0" smtClean="0"/>
+              <a:t>Web</a:t>
+            </a:r>
+            <a:r>
+              <a:rPr lang="ja-JP" altLang="en-US" dirty="0" smtClean="0"/>
+              <a:t>アプリケーションへ電子署名をアップロードし、スキャンを実施します。</a:t>
+            </a:r>
+            <a:endParaRPr lang="sv-SE" dirty="0"/>
+          </a:p>
+        </p:txBody>
+      </p:sp>
+      <p:sp>
+        <p:nvSpPr>
+          <p:cNvPr id="59" name="TextBox 58"/>
+          <p:cNvSpPr txBox="1"/>
+          <p:nvPr/>
+        </p:nvSpPr>
+        <p:spPr>
+          <a:xfrm>
+            <a:off x="2274950" y="3015825"/>
+            <a:ext cx="1917040" cy="276999"/>
+          </a:xfrm>
+          <a:prstGeom prst="rect">
+            <a:avLst/>
+          </a:prstGeom>
+          <a:noFill/>
+        </p:spPr>
+        <p:txBody>
+          <a:bodyPr wrap="square" rtlCol="0">
+            <a:spAutoFit/>
+          </a:bodyPr>
+          <a:lstStyle>
+            <a:defPPr>
+              <a:defRPr lang="sv-SE"/>
+            </a:defPPr>
+            <a:lvl1pPr algn="ctr">
+              <a:defRPr sz="1200" b="1">
+                <a:latin typeface="メイリオ" panose="020B0604030504040204" pitchFamily="50" charset="-128"/>
+                <a:ea typeface="メイリオ" panose="020B0604030504040204" pitchFamily="50" charset="-128"/>
+                <a:cs typeface="メイリオ" panose="020B0604030504040204" pitchFamily="50" charset="-128"/>
+              </a:defRPr>
+            </a:lvl1pPr>
+          </a:lstStyle>
+          <a:p>
+            <a:r>
+              <a:rPr lang="ja-JP" altLang="en-US" dirty="0" smtClean="0"/>
+              <a:t>アップロードとスキャン</a:t>
+            </a:r>
+            <a:endParaRPr lang="sv-SE" dirty="0"/>
+          </a:p>
+        </p:txBody>
+      </p:sp>
+      <p:sp>
+        <p:nvSpPr>
+          <p:cNvPr id="60" name="TextBox 59"/>
+          <p:cNvSpPr txBox="1"/>
+          <p:nvPr/>
+        </p:nvSpPr>
+        <p:spPr>
+          <a:xfrm>
+            <a:off x="4603405" y="3259834"/>
+            <a:ext cx="2394428" cy="938719"/>
+          </a:xfrm>
+          <a:prstGeom prst="rect">
+            <a:avLst/>
+          </a:prstGeom>
+          <a:noFill/>
+        </p:spPr>
+        <p:txBody>
+          <a:bodyPr wrap="square" rtlCol="0">
+            <a:spAutoFit/>
+          </a:bodyPr>
+          <a:lstStyle>
+            <a:defPPr>
+              <a:defRPr lang="sv-SE"/>
+            </a:defPPr>
+            <a:lvl1pPr>
+              <a:defRPr sz="1100">
+                <a:latin typeface="メイリオ" panose="020B0604030504040204" pitchFamily="50" charset="-128"/>
+                <a:ea typeface="メイリオ" panose="020B0604030504040204" pitchFamily="50" charset="-128"/>
+                <a:cs typeface="メイリオ" panose="020B0604030504040204" pitchFamily="50" charset="-128"/>
+              </a:defRPr>
+            </a:lvl1pPr>
+          </a:lstStyle>
+          <a:p>
+            <a:r>
+              <a:rPr lang="en-US" dirty="0"/>
+              <a:t>FOSSID </a:t>
+            </a:r>
+            <a:r>
+              <a:rPr lang="en-US" dirty="0" smtClean="0"/>
+              <a:t>AB</a:t>
+            </a:r>
+            <a:r>
+              <a:rPr lang="ja-JP" altLang="en-US" dirty="0" smtClean="0"/>
+              <a:t>が対象企業向けに、ツールの操作方法（スキャン実行、レビュー結果、レポート生成）を説明する、最初のセッションを実施します。</a:t>
+            </a:r>
+            <a:endParaRPr lang="sv-SE" dirty="0"/>
+          </a:p>
+        </p:txBody>
+      </p:sp>
+      <p:sp>
+        <p:nvSpPr>
+          <p:cNvPr id="61" name="TextBox 60"/>
+          <p:cNvSpPr txBox="1"/>
+          <p:nvPr/>
+        </p:nvSpPr>
+        <p:spPr>
+          <a:xfrm>
+            <a:off x="4565949" y="3018152"/>
+            <a:ext cx="2388409" cy="276999"/>
+          </a:xfrm>
+          <a:prstGeom prst="rect">
+            <a:avLst/>
+          </a:prstGeom>
+          <a:noFill/>
+        </p:spPr>
+        <p:txBody>
+          <a:bodyPr wrap="square" rtlCol="0">
+            <a:spAutoFit/>
+          </a:bodyPr>
+          <a:lstStyle>
+            <a:defPPr>
+              <a:defRPr lang="sv-SE"/>
+            </a:defPPr>
+            <a:lvl1pPr algn="ctr">
+              <a:defRPr sz="1200" b="1">
+                <a:latin typeface="メイリオ" panose="020B0604030504040204" pitchFamily="50" charset="-128"/>
+                <a:ea typeface="メイリオ" panose="020B0604030504040204" pitchFamily="50" charset="-128"/>
+                <a:cs typeface="メイリオ" panose="020B0604030504040204" pitchFamily="50" charset="-128"/>
+              </a:defRPr>
+            </a:lvl1pPr>
+          </a:lstStyle>
+          <a:p>
+            <a:r>
+              <a:rPr lang="ja-JP" altLang="en-US" dirty="0" smtClean="0"/>
+              <a:t>オンラインでの初期設定</a:t>
+            </a:r>
+            <a:endParaRPr lang="sv-SE" dirty="0"/>
+          </a:p>
+        </p:txBody>
+      </p:sp>
+      <p:sp>
+        <p:nvSpPr>
+          <p:cNvPr id="51" name="TextBox 50"/>
+          <p:cNvSpPr txBox="1"/>
+          <p:nvPr/>
+        </p:nvSpPr>
+        <p:spPr>
+          <a:xfrm>
+            <a:off x="7356856" y="3259834"/>
+            <a:ext cx="2118486" cy="769441"/>
+          </a:xfrm>
+          <a:prstGeom prst="rect">
+            <a:avLst/>
+          </a:prstGeom>
+          <a:noFill/>
+        </p:spPr>
+        <p:txBody>
+          <a:bodyPr wrap="square" rtlCol="0">
+            <a:spAutoFit/>
+          </a:bodyPr>
+          <a:lstStyle>
+            <a:defPPr>
+              <a:defRPr lang="sv-SE"/>
+            </a:defPPr>
+            <a:lvl1pPr>
+              <a:defRPr sz="1100">
+                <a:latin typeface="メイリオ" panose="020B0604030504040204" pitchFamily="50" charset="-128"/>
+                <a:ea typeface="メイリオ" panose="020B0604030504040204" pitchFamily="50" charset="-128"/>
+                <a:cs typeface="メイリオ" panose="020B0604030504040204" pitchFamily="50" charset="-128"/>
+              </a:defRPr>
+            </a:lvl1pPr>
+          </a:lstStyle>
+          <a:p>
+            <a:r>
+              <a:rPr lang="en-US" dirty="0"/>
+              <a:t>FOSSID </a:t>
+            </a:r>
+            <a:r>
+              <a:rPr lang="en-US" dirty="0" smtClean="0"/>
+              <a:t>AB</a:t>
+            </a:r>
+            <a:r>
+              <a:rPr lang="ja-JP" altLang="en-US" dirty="0"/>
+              <a:t>が</a:t>
+            </a:r>
+            <a:r>
+              <a:rPr lang="ja-JP" altLang="en-US" dirty="0" smtClean="0"/>
+              <a:t>対象企業に対し、期間限定で</a:t>
+            </a:r>
+            <a:r>
+              <a:rPr lang="ja-JP" altLang="en-US" dirty="0"/>
+              <a:t>彼らの</a:t>
+            </a:r>
+            <a:r>
+              <a:rPr lang="en-US" altLang="ja-JP" dirty="0"/>
+              <a:t>Web</a:t>
+            </a:r>
+            <a:r>
+              <a:rPr lang="ja-JP" altLang="en-US" dirty="0" smtClean="0"/>
+              <a:t>アプリケーションインスタンスへのアクセスを提供します。</a:t>
+            </a:r>
+            <a:endParaRPr lang="sv-SE" dirty="0"/>
+          </a:p>
+        </p:txBody>
+      </p:sp>
+      <p:sp>
+        <p:nvSpPr>
+          <p:cNvPr id="52" name="TextBox 51"/>
+          <p:cNvSpPr txBox="1"/>
+          <p:nvPr/>
+        </p:nvSpPr>
+        <p:spPr>
+          <a:xfrm>
+            <a:off x="7284570" y="3022902"/>
+            <a:ext cx="2212061" cy="276999"/>
+          </a:xfrm>
+          <a:prstGeom prst="rect">
+            <a:avLst/>
+          </a:prstGeom>
+          <a:noFill/>
+        </p:spPr>
+        <p:txBody>
+          <a:bodyPr wrap="square" rtlCol="0">
+            <a:spAutoFit/>
+          </a:bodyPr>
+          <a:lstStyle>
+            <a:defPPr>
+              <a:defRPr lang="sv-SE"/>
+            </a:defPPr>
+            <a:lvl1pPr algn="ctr">
+              <a:defRPr sz="1200" b="1">
+                <a:latin typeface="メイリオ" panose="020B0604030504040204" pitchFamily="50" charset="-128"/>
+                <a:ea typeface="メイリオ" panose="020B0604030504040204" pitchFamily="50" charset="-128"/>
+                <a:cs typeface="メイリオ" panose="020B0604030504040204" pitchFamily="50" charset="-128"/>
+              </a:defRPr>
+            </a:lvl1pPr>
+          </a:lstStyle>
+          <a:p>
+            <a:r>
+              <a:rPr lang="ja-JP" altLang="en-US" dirty="0" smtClean="0"/>
+              <a:t>専用</a:t>
+            </a:r>
+            <a:r>
+              <a:rPr lang="en-US" altLang="ja-JP" dirty="0" smtClean="0"/>
+              <a:t>Web</a:t>
+            </a:r>
+            <a:r>
+              <a:rPr lang="ja-JP" altLang="en-US" dirty="0" smtClean="0"/>
+              <a:t>アプリケーション</a:t>
+            </a:r>
+            <a:endParaRPr lang="sv-SE" dirty="0"/>
+          </a:p>
+        </p:txBody>
+      </p:sp>
+      <p:pic>
+        <p:nvPicPr>
+          <p:cNvPr id="4" name="Picture 3"/>
+          <p:cNvPicPr>
+            <a:picLocks noChangeAspect="1"/>
+          </p:cNvPicPr>
+          <p:nvPr/>
+        </p:nvPicPr>
+        <p:blipFill>
+          <a:blip r:embed="rId3" cstate="print">
+            <a:extLst>
+              <a:ext uri="{28A0092B-C50C-407E-A947-70E740481C1C}">
+                <a14:useLocalDpi xmlns:a14="http://schemas.microsoft.com/office/drawing/2010/main" val="0"/>
+              </a:ext>
+            </a:extLst>
+          </a:blip>
+          <a:stretch>
+            <a:fillRect/>
+          </a:stretch>
+        </p:blipFill>
+        <p:spPr>
+          <a:xfrm>
+            <a:off x="5497308" y="2393073"/>
+            <a:ext cx="525689" cy="525689"/>
+          </a:xfrm>
+          <a:prstGeom prst="rect">
+            <a:avLst/>
+          </a:prstGeom>
+        </p:spPr>
+      </p:pic>
+      <p:pic>
+        <p:nvPicPr>
+          <p:cNvPr id="7" name="Picture 6"/>
+          <p:cNvPicPr>
+            <a:picLocks noChangeAspect="1"/>
+          </p:cNvPicPr>
+          <p:nvPr/>
+        </p:nvPicPr>
+        <p:blipFill>
+          <a:blip r:embed="rId4" cstate="print">
+            <a:extLst>
+              <a:ext uri="{28A0092B-C50C-407E-A947-70E740481C1C}">
+                <a14:useLocalDpi xmlns:a14="http://schemas.microsoft.com/office/drawing/2010/main" val="0"/>
+              </a:ext>
+            </a:extLst>
+          </a:blip>
+          <a:stretch>
+            <a:fillRect/>
+          </a:stretch>
+        </p:blipFill>
+        <p:spPr>
+          <a:xfrm>
+            <a:off x="7961572" y="4369011"/>
+            <a:ext cx="660640" cy="660640"/>
+          </a:xfrm>
+          <a:prstGeom prst="rect">
+            <a:avLst/>
+          </a:prstGeom>
+        </p:spPr>
+      </p:pic>
+      <p:sp>
+        <p:nvSpPr>
+          <p:cNvPr id="70" name="TextBox 69"/>
+          <p:cNvSpPr txBox="1"/>
+          <p:nvPr/>
+        </p:nvSpPr>
+        <p:spPr>
+          <a:xfrm>
+            <a:off x="1624606" y="5311492"/>
+            <a:ext cx="2445505" cy="1277273"/>
+          </a:xfrm>
+          <a:prstGeom prst="rect">
+            <a:avLst/>
+          </a:prstGeom>
+          <a:noFill/>
+        </p:spPr>
+        <p:txBody>
+          <a:bodyPr wrap="square" rtlCol="0">
+            <a:spAutoFit/>
+          </a:bodyPr>
+          <a:lstStyle>
+            <a:defPPr>
+              <a:defRPr lang="sv-SE"/>
+            </a:defPPr>
+            <a:lvl1pPr>
+              <a:defRPr sz="1100">
+                <a:latin typeface="メイリオ" panose="020B0604030504040204" pitchFamily="50" charset="-128"/>
+                <a:ea typeface="メイリオ" panose="020B0604030504040204" pitchFamily="50" charset="-128"/>
+                <a:cs typeface="メイリオ" panose="020B0604030504040204" pitchFamily="50" charset="-128"/>
+              </a:defRPr>
+            </a:lvl1pPr>
+          </a:lstStyle>
+          <a:p>
+            <a:r>
+              <a:rPr lang="ja-JP" altLang="en-US" dirty="0" smtClean="0"/>
+              <a:t>ターゲット企業がコードを監査できるようになり、すべてのファイルやスニペットについて</a:t>
+            </a:r>
+            <a:r>
+              <a:rPr lang="en-US" altLang="ja-JP" dirty="0" smtClean="0"/>
+              <a:t>FOSSID</a:t>
+            </a:r>
+            <a:r>
+              <a:rPr lang="ja-JP" altLang="en-US" dirty="0" smtClean="0"/>
+              <a:t>社のオープンソース データベースとの適合を調査し、部品表（</a:t>
+            </a:r>
+            <a:r>
+              <a:rPr lang="en-US" altLang="ja-JP" dirty="0" smtClean="0"/>
+              <a:t>Bill of </a:t>
+            </a:r>
+            <a:r>
+              <a:rPr lang="en-US" altLang="ja-JP" dirty="0" err="1" smtClean="0"/>
+              <a:t>Matrials</a:t>
+            </a:r>
+            <a:r>
+              <a:rPr lang="ja-JP" altLang="en-US" dirty="0" smtClean="0"/>
+              <a:t>）と</a:t>
+            </a:r>
+            <a:r>
+              <a:rPr lang="en-US" altLang="ja-JP" dirty="0" smtClean="0"/>
+              <a:t>SPDX</a:t>
+            </a:r>
+            <a:r>
+              <a:rPr lang="ja-JP" altLang="en-US" dirty="0" smtClean="0"/>
+              <a:t>対応のレポートを生成します。</a:t>
+            </a:r>
+            <a:endParaRPr lang="sv-SE" dirty="0"/>
+          </a:p>
+        </p:txBody>
+      </p:sp>
+      <p:sp>
+        <p:nvSpPr>
+          <p:cNvPr id="75" name="TextBox 74"/>
+          <p:cNvSpPr txBox="1"/>
+          <p:nvPr/>
+        </p:nvSpPr>
+        <p:spPr>
+          <a:xfrm>
+            <a:off x="1532769" y="5097125"/>
+            <a:ext cx="2539130" cy="276999"/>
+          </a:xfrm>
+          <a:prstGeom prst="rect">
+            <a:avLst/>
+          </a:prstGeom>
+          <a:noFill/>
+        </p:spPr>
+        <p:txBody>
+          <a:bodyPr wrap="square" rtlCol="0">
+            <a:spAutoFit/>
+          </a:bodyPr>
+          <a:lstStyle>
+            <a:defPPr>
+              <a:defRPr lang="sv-SE"/>
+            </a:defPPr>
+            <a:lvl1pPr algn="ctr">
+              <a:defRPr sz="1200" b="1">
+                <a:latin typeface="メイリオ" panose="020B0604030504040204" pitchFamily="50" charset="-128"/>
+                <a:ea typeface="メイリオ" panose="020B0604030504040204" pitchFamily="50" charset="-128"/>
+                <a:cs typeface="メイリオ" panose="020B0604030504040204" pitchFamily="50" charset="-128"/>
+              </a:defRPr>
+            </a:lvl1pPr>
+          </a:lstStyle>
+          <a:p>
+            <a:r>
+              <a:rPr lang="ja-JP" altLang="en-US" dirty="0" smtClean="0"/>
+              <a:t>自身のソフトウェアの監査</a:t>
+            </a:r>
+            <a:endParaRPr lang="sv-SE" dirty="0"/>
+          </a:p>
+        </p:txBody>
+      </p:sp>
+      <p:sp>
+        <p:nvSpPr>
+          <p:cNvPr id="82" name="TextBox 81"/>
+          <p:cNvSpPr txBox="1"/>
+          <p:nvPr/>
+        </p:nvSpPr>
+        <p:spPr>
+          <a:xfrm>
+            <a:off x="7041618" y="5323080"/>
+            <a:ext cx="2697964" cy="938719"/>
+          </a:xfrm>
+          <a:prstGeom prst="rect">
+            <a:avLst/>
+          </a:prstGeom>
+          <a:noFill/>
+        </p:spPr>
+        <p:txBody>
+          <a:bodyPr wrap="square" rtlCol="0">
+            <a:spAutoFit/>
+          </a:bodyPr>
+          <a:lstStyle>
+            <a:defPPr>
+              <a:defRPr lang="sv-SE"/>
+            </a:defPPr>
+            <a:lvl1pPr>
+              <a:defRPr sz="1100">
+                <a:latin typeface="メイリオ" panose="020B0604030504040204" pitchFamily="50" charset="-128"/>
+                <a:ea typeface="メイリオ" panose="020B0604030504040204" pitchFamily="50" charset="-128"/>
+                <a:cs typeface="メイリオ" panose="020B0604030504040204" pitchFamily="50" charset="-128"/>
+              </a:defRPr>
+            </a:lvl1pPr>
+          </a:lstStyle>
+          <a:p>
+            <a:r>
+              <a:rPr lang="en-US" dirty="0" smtClean="0"/>
+              <a:t>DIY</a:t>
+            </a:r>
+            <a:r>
+              <a:rPr lang="ja-JP" altLang="en-US" dirty="0" smtClean="0"/>
+              <a:t>監査の期間が満了と</a:t>
+            </a:r>
+            <a:r>
+              <a:rPr lang="ja-JP" altLang="en-US" dirty="0"/>
+              <a:t>なる</a:t>
+            </a:r>
+            <a:r>
+              <a:rPr lang="ja-JP" altLang="en-US" dirty="0" smtClean="0"/>
+              <a:t>と</a:t>
+            </a:r>
+            <a:r>
+              <a:rPr lang="en-US" altLang="ja-JP" dirty="0" smtClean="0"/>
+              <a:t>Web</a:t>
+            </a:r>
+            <a:r>
+              <a:rPr lang="ja-JP" altLang="en-US" dirty="0" smtClean="0"/>
+              <a:t>アプリケーションのインスタンスと、関連情報が</a:t>
+            </a:r>
+            <a:r>
+              <a:rPr lang="en-US" altLang="ja-JP" dirty="0" smtClean="0"/>
+              <a:t>FOSSID</a:t>
+            </a:r>
+            <a:r>
+              <a:rPr lang="ja-JP" altLang="en-US" dirty="0" smtClean="0"/>
+              <a:t>のシステムから消去されます。対象企業には</a:t>
+            </a:r>
+            <a:r>
+              <a:rPr lang="ja-JP" altLang="en-US" dirty="0"/>
+              <a:t>公式な消去確認が</a:t>
+            </a:r>
+            <a:r>
+              <a:rPr lang="ja-JP" altLang="en-US" dirty="0" smtClean="0"/>
+              <a:t>送付されます。</a:t>
+            </a:r>
+            <a:endParaRPr lang="sv-SE" dirty="0"/>
+          </a:p>
+        </p:txBody>
+      </p:sp>
+      <p:sp>
+        <p:nvSpPr>
+          <p:cNvPr id="83" name="TextBox 82"/>
+          <p:cNvSpPr txBox="1"/>
+          <p:nvPr/>
+        </p:nvSpPr>
+        <p:spPr>
+          <a:xfrm>
+            <a:off x="7297706" y="5103539"/>
+            <a:ext cx="2133240" cy="276999"/>
+          </a:xfrm>
+          <a:prstGeom prst="rect">
+            <a:avLst/>
+          </a:prstGeom>
+          <a:noFill/>
+        </p:spPr>
+        <p:txBody>
+          <a:bodyPr wrap="square" rtlCol="0">
+            <a:spAutoFit/>
+          </a:bodyPr>
+          <a:lstStyle>
+            <a:defPPr>
+              <a:defRPr lang="sv-SE"/>
+            </a:defPPr>
+            <a:lvl1pPr algn="ctr">
+              <a:defRPr sz="1200" b="1">
+                <a:latin typeface="メイリオ" panose="020B0604030504040204" pitchFamily="50" charset="-128"/>
+                <a:ea typeface="メイリオ" panose="020B0604030504040204" pitchFamily="50" charset="-128"/>
+                <a:cs typeface="メイリオ" panose="020B0604030504040204" pitchFamily="50" charset="-128"/>
+              </a:defRPr>
+            </a:lvl1pPr>
+          </a:lstStyle>
+          <a:p>
+            <a:r>
+              <a:rPr lang="ja-JP" altLang="en-US" dirty="0" smtClean="0"/>
+              <a:t>監査終了とデータ削除</a:t>
+            </a:r>
+            <a:endParaRPr lang="sv-SE" dirty="0"/>
+          </a:p>
+        </p:txBody>
+      </p:sp>
+      <p:grpSp>
+        <p:nvGrpSpPr>
+          <p:cNvPr id="3" name="Group 2"/>
+          <p:cNvGrpSpPr/>
+          <p:nvPr/>
+        </p:nvGrpSpPr>
+        <p:grpSpPr>
+          <a:xfrm>
+            <a:off x="7915633" y="2361915"/>
+            <a:ext cx="780798" cy="641776"/>
+            <a:chOff x="8501211" y="2333971"/>
+            <a:chExt cx="1068985" cy="818980"/>
+          </a:xfrm>
+        </p:grpSpPr>
+        <p:pic>
+          <p:nvPicPr>
+            <p:cNvPr id="11" name="Picture 10"/>
+            <p:cNvPicPr>
+              <a:picLocks noChangeAspect="1"/>
+            </p:cNvPicPr>
+            <p:nvPr/>
+          </p:nvPicPr>
+          <p:blipFill>
+            <a:blip r:embed="rId5" cstate="print">
+              <a:extLst>
+                <a:ext uri="{28A0092B-C50C-407E-A947-70E740481C1C}">
+                  <a14:useLocalDpi xmlns:a14="http://schemas.microsoft.com/office/drawing/2010/main" val="0"/>
+                </a:ext>
+              </a:extLst>
+            </a:blip>
+            <a:stretch>
+              <a:fillRect/>
+            </a:stretch>
+          </p:blipFill>
+          <p:spPr>
+            <a:xfrm>
+              <a:off x="8501211" y="2333971"/>
+              <a:ext cx="818980" cy="818980"/>
+            </a:xfrm>
+            <a:prstGeom prst="rect">
+              <a:avLst/>
+            </a:prstGeom>
+          </p:spPr>
+        </p:pic>
+        <p:pic>
+          <p:nvPicPr>
+            <p:cNvPr id="14" name="Picture 13"/>
+            <p:cNvPicPr>
+              <a:picLocks noChangeAspect="1"/>
+            </p:cNvPicPr>
+            <p:nvPr/>
+          </p:nvPicPr>
+          <p:blipFill>
+            <a:blip r:embed="rId6" cstate="print">
+              <a:extLst>
+                <a:ext uri="{28A0092B-C50C-407E-A947-70E740481C1C}">
+                  <a14:useLocalDpi xmlns:a14="http://schemas.microsoft.com/office/drawing/2010/main" val="0"/>
+                </a:ext>
+              </a:extLst>
+            </a:blip>
+            <a:stretch>
+              <a:fillRect/>
+            </a:stretch>
+          </p:blipFill>
+          <p:spPr>
+            <a:xfrm flipH="1">
+              <a:off x="9086175" y="2500826"/>
+              <a:ext cx="484021" cy="484021"/>
+            </a:xfrm>
+            <a:prstGeom prst="rect">
+              <a:avLst/>
+            </a:prstGeom>
+          </p:spPr>
+        </p:pic>
+      </p:grpSp>
+      <p:grpSp>
+        <p:nvGrpSpPr>
+          <p:cNvPr id="9" name="Group 8"/>
+          <p:cNvGrpSpPr/>
+          <p:nvPr/>
+        </p:nvGrpSpPr>
+        <p:grpSpPr>
+          <a:xfrm>
+            <a:off x="2833820" y="2382478"/>
+            <a:ext cx="770852" cy="559230"/>
+            <a:chOff x="3239173" y="2291037"/>
+            <a:chExt cx="974185" cy="778581"/>
+          </a:xfrm>
+        </p:grpSpPr>
+        <p:pic>
+          <p:nvPicPr>
+            <p:cNvPr id="12" name="Picture 11"/>
+            <p:cNvPicPr>
+              <a:picLocks noChangeAspect="1"/>
+            </p:cNvPicPr>
+            <p:nvPr/>
+          </p:nvPicPr>
+          <p:blipFill>
+            <a:blip r:embed="rId7" cstate="print">
+              <a:extLst>
+                <a:ext uri="{28A0092B-C50C-407E-A947-70E740481C1C}">
+                  <a14:useLocalDpi xmlns:a14="http://schemas.microsoft.com/office/drawing/2010/main" val="0"/>
+                </a:ext>
+              </a:extLst>
+            </a:blip>
+            <a:stretch>
+              <a:fillRect/>
+            </a:stretch>
+          </p:blipFill>
+          <p:spPr>
+            <a:xfrm>
+              <a:off x="3642250" y="2291037"/>
+              <a:ext cx="571108" cy="571108"/>
+            </a:xfrm>
+            <a:prstGeom prst="rect">
+              <a:avLst/>
+            </a:prstGeom>
+          </p:spPr>
+        </p:pic>
+        <p:pic>
+          <p:nvPicPr>
+            <p:cNvPr id="65" name="Picture 64"/>
+            <p:cNvPicPr>
+              <a:picLocks noChangeAspect="1"/>
+            </p:cNvPicPr>
+            <p:nvPr/>
+          </p:nvPicPr>
+          <p:blipFill>
+            <a:blip r:embed="rId8" cstate="print">
+              <a:extLst>
+                <a:ext uri="{28A0092B-C50C-407E-A947-70E740481C1C}">
+                  <a14:useLocalDpi xmlns:a14="http://schemas.microsoft.com/office/drawing/2010/main" val="0"/>
+                </a:ext>
+              </a:extLst>
+            </a:blip>
+            <a:stretch>
+              <a:fillRect/>
+            </a:stretch>
+          </p:blipFill>
+          <p:spPr>
+            <a:xfrm>
+              <a:off x="3239173" y="2527926"/>
+              <a:ext cx="541692" cy="541692"/>
+            </a:xfrm>
+            <a:prstGeom prst="rect">
+              <a:avLst/>
+            </a:prstGeom>
+          </p:spPr>
+        </p:pic>
+        <p:pic>
+          <p:nvPicPr>
+            <p:cNvPr id="94" name="Picture 93"/>
+            <p:cNvPicPr>
+              <a:picLocks noChangeAspect="1"/>
+            </p:cNvPicPr>
+            <p:nvPr/>
+          </p:nvPicPr>
+          <p:blipFill>
+            <a:blip r:embed="rId9" cstate="print">
+              <a:extLst>
+                <a:ext uri="{28A0092B-C50C-407E-A947-70E740481C1C}">
+                  <a14:useLocalDpi xmlns:a14="http://schemas.microsoft.com/office/drawing/2010/main" val="0"/>
+                </a:ext>
+              </a:extLst>
+            </a:blip>
+            <a:stretch>
+              <a:fillRect/>
+            </a:stretch>
+          </p:blipFill>
+          <p:spPr>
+            <a:xfrm>
+              <a:off x="3848308" y="2442251"/>
+              <a:ext cx="310050" cy="310050"/>
+            </a:xfrm>
+            <a:prstGeom prst="rect">
+              <a:avLst/>
+            </a:prstGeom>
+          </p:spPr>
+        </p:pic>
+        <p:pic>
+          <p:nvPicPr>
+            <p:cNvPr id="88" name="Picture 87"/>
+            <p:cNvPicPr>
+              <a:picLocks noChangeAspect="1"/>
+            </p:cNvPicPr>
+            <p:nvPr/>
+          </p:nvPicPr>
+          <p:blipFill>
+            <a:blip r:embed="rId10"/>
+            <a:stretch>
+              <a:fillRect/>
+            </a:stretch>
+          </p:blipFill>
+          <p:spPr>
+            <a:xfrm rot="2749760">
+              <a:off x="3559532" y="2578585"/>
+              <a:ext cx="359171" cy="325819"/>
+            </a:xfrm>
+            <a:prstGeom prst="rect">
+              <a:avLst/>
+            </a:prstGeom>
+          </p:spPr>
+        </p:pic>
+      </p:grpSp>
+      <p:sp>
+        <p:nvSpPr>
+          <p:cNvPr id="62" name="TextBox 61"/>
+          <p:cNvSpPr txBox="1"/>
+          <p:nvPr/>
+        </p:nvSpPr>
+        <p:spPr>
+          <a:xfrm>
+            <a:off x="4280301" y="5097125"/>
+            <a:ext cx="2397260" cy="276999"/>
+          </a:xfrm>
+          <a:prstGeom prst="rect">
+            <a:avLst/>
+          </a:prstGeom>
+          <a:noFill/>
+        </p:spPr>
+        <p:txBody>
+          <a:bodyPr wrap="square" rtlCol="0">
+            <a:spAutoFit/>
+          </a:bodyPr>
+          <a:lstStyle>
+            <a:defPPr>
+              <a:defRPr lang="sv-SE"/>
+            </a:defPPr>
+            <a:lvl1pPr algn="ctr">
+              <a:defRPr sz="1200" b="1">
+                <a:latin typeface="メイリオ" panose="020B0604030504040204" pitchFamily="50" charset="-128"/>
+                <a:ea typeface="メイリオ" panose="020B0604030504040204" pitchFamily="50" charset="-128"/>
+                <a:cs typeface="メイリオ" panose="020B0604030504040204" pitchFamily="50" charset="-128"/>
+              </a:defRPr>
+            </a:lvl1pPr>
+          </a:lstStyle>
+          <a:p>
+            <a:r>
+              <a:rPr lang="ja-JP" altLang="en-US" dirty="0"/>
+              <a:t>独自</a:t>
+            </a:r>
+            <a:r>
+              <a:rPr lang="ja-JP" altLang="en-US" dirty="0" smtClean="0"/>
+              <a:t>検証</a:t>
+            </a:r>
+            <a:endParaRPr lang="en-US" dirty="0"/>
+          </a:p>
+        </p:txBody>
+      </p:sp>
+      <p:sp>
+        <p:nvSpPr>
+          <p:cNvPr id="63" name="TextBox 62"/>
+          <p:cNvSpPr txBox="1"/>
+          <p:nvPr/>
+        </p:nvSpPr>
+        <p:spPr>
+          <a:xfrm>
+            <a:off x="4340407" y="5323080"/>
+            <a:ext cx="2474998" cy="769441"/>
+          </a:xfrm>
+          <a:prstGeom prst="rect">
+            <a:avLst/>
+          </a:prstGeom>
+          <a:noFill/>
+        </p:spPr>
+        <p:txBody>
+          <a:bodyPr wrap="square" rtlCol="0">
+            <a:spAutoFit/>
+          </a:bodyPr>
+          <a:lstStyle>
+            <a:defPPr>
+              <a:defRPr lang="sv-SE"/>
+            </a:defPPr>
+            <a:lvl1pPr>
+              <a:defRPr sz="1100">
+                <a:latin typeface="メイリオ" panose="020B0604030504040204" pitchFamily="50" charset="-128"/>
+                <a:ea typeface="メイリオ" panose="020B0604030504040204" pitchFamily="50" charset="-128"/>
+                <a:cs typeface="メイリオ" panose="020B0604030504040204" pitchFamily="50" charset="-128"/>
+              </a:defRPr>
+            </a:lvl1pPr>
+          </a:lstStyle>
+          <a:p>
+            <a:r>
+              <a:rPr lang="en-US" dirty="0"/>
+              <a:t>FOSSID </a:t>
+            </a:r>
+            <a:r>
+              <a:rPr lang="en-US" dirty="0" smtClean="0"/>
+              <a:t>AB</a:t>
+            </a:r>
+            <a:r>
+              <a:rPr lang="ja-JP" altLang="en-US" dirty="0" smtClean="0"/>
+              <a:t>社のコンプライアンスエンジニアが監査対象のファイルから</a:t>
+            </a:r>
+            <a:r>
+              <a:rPr lang="en-US" altLang="ja-JP" dirty="0" smtClean="0"/>
+              <a:t>1%</a:t>
+            </a:r>
+            <a:r>
+              <a:rPr lang="ja-JP" altLang="en-US" dirty="0" smtClean="0"/>
+              <a:t>を無作為に抽出し、検証します。</a:t>
+            </a:r>
+            <a:endParaRPr lang="sv-SE" dirty="0"/>
+          </a:p>
+        </p:txBody>
+      </p:sp>
+      <p:grpSp>
+        <p:nvGrpSpPr>
+          <p:cNvPr id="10" name="Group 9"/>
+          <p:cNvGrpSpPr/>
+          <p:nvPr/>
+        </p:nvGrpSpPr>
+        <p:grpSpPr>
+          <a:xfrm>
+            <a:off x="5042860" y="4294625"/>
+            <a:ext cx="721526" cy="744916"/>
+            <a:chOff x="4856662" y="4176638"/>
+            <a:chExt cx="721526" cy="744916"/>
+          </a:xfrm>
+        </p:grpSpPr>
+        <p:pic>
+          <p:nvPicPr>
+            <p:cNvPr id="72" name="Picture 71"/>
+            <p:cNvPicPr>
+              <a:picLocks noChangeAspect="1"/>
+            </p:cNvPicPr>
+            <p:nvPr/>
+          </p:nvPicPr>
+          <p:blipFill>
+            <a:blip r:embed="rId11" cstate="print">
+              <a:extLst>
+                <a:ext uri="{28A0092B-C50C-407E-A947-70E740481C1C}">
+                  <a14:useLocalDpi xmlns:a14="http://schemas.microsoft.com/office/drawing/2010/main" val="0"/>
+                </a:ext>
+              </a:extLst>
+            </a:blip>
+            <a:stretch>
+              <a:fillRect/>
+            </a:stretch>
+          </p:blipFill>
+          <p:spPr>
+            <a:xfrm>
+              <a:off x="4856662" y="4176638"/>
+              <a:ext cx="721526" cy="721526"/>
+            </a:xfrm>
+            <a:prstGeom prst="rect">
+              <a:avLst/>
+            </a:prstGeom>
+          </p:spPr>
+        </p:pic>
+        <p:pic>
+          <p:nvPicPr>
+            <p:cNvPr id="73" name="Picture 72"/>
+            <p:cNvPicPr>
+              <a:picLocks noChangeAspect="1"/>
+            </p:cNvPicPr>
+            <p:nvPr/>
+          </p:nvPicPr>
+          <p:blipFill>
+            <a:blip r:embed="rId12" cstate="print">
+              <a:extLst>
+                <a:ext uri="{28A0092B-C50C-407E-A947-70E740481C1C}">
+                  <a14:useLocalDpi xmlns:a14="http://schemas.microsoft.com/office/drawing/2010/main" val="0"/>
+                </a:ext>
+              </a:extLst>
+            </a:blip>
+            <a:stretch>
+              <a:fillRect/>
+            </a:stretch>
+          </p:blipFill>
+          <p:spPr>
+            <a:xfrm rot="2390679">
+              <a:off x="5249921" y="4265722"/>
+              <a:ext cx="283575" cy="655832"/>
+            </a:xfrm>
+            <a:prstGeom prst="rect">
+              <a:avLst/>
+            </a:prstGeom>
+          </p:spPr>
+        </p:pic>
+      </p:grpSp>
+      <p:sp>
+        <p:nvSpPr>
+          <p:cNvPr id="53" name="Rounded Rectangle 52"/>
+          <p:cNvSpPr/>
+          <p:nvPr/>
+        </p:nvSpPr>
+        <p:spPr>
+          <a:xfrm>
+            <a:off x="9678541" y="4791118"/>
+            <a:ext cx="651058" cy="566057"/>
+          </a:xfrm>
+          <a:prstGeom prst="roundRect">
+            <a:avLst/>
+          </a:prstGeom>
+          <a:noFill/>
+          <a:ln w="38100">
+            <a:solidFill>
+              <a:srgbClr val="2CA4F2"/>
+            </a:solidFill>
+          </a:ln>
+        </p:spPr>
+        <p:style>
+          <a:lnRef idx="2">
+            <a:schemeClr val="accent1">
+              <a:shade val="50000"/>
+            </a:schemeClr>
+          </a:lnRef>
+          <a:fillRef idx="1">
+            <a:schemeClr val="accent1"/>
+          </a:fillRef>
+          <a:effectRef idx="0">
+            <a:schemeClr val="accent1"/>
+          </a:effectRef>
+          <a:fontRef idx="minor">
+            <a:schemeClr val="lt1"/>
+          </a:fontRef>
+        </p:style>
+        <p:txBody>
+          <a:bodyPr rtlCol="0" anchor="ctr"/>
+          <a:lstStyle/>
+          <a:p>
+            <a:pPr algn="ctr"/>
+            <a:r>
+              <a:rPr lang="ja-JP" altLang="en-US" sz="1400" b="1" i="1" dirty="0">
+                <a:solidFill>
+                  <a:schemeClr val="tx1"/>
+                </a:solidFill>
+                <a:latin typeface="メイリオ" panose="020B0604030504040204" pitchFamily="50" charset="-128"/>
+                <a:ea typeface="メイリオ" panose="020B0604030504040204" pitchFamily="50" charset="-128"/>
+                <a:cs typeface="メイリオ" panose="020B0604030504040204" pitchFamily="50" charset="-128"/>
+              </a:rPr>
+              <a:t>終了</a:t>
+            </a:r>
+            <a:endParaRPr lang="en-US" sz="1400" b="1" i="1" dirty="0">
+              <a:solidFill>
+                <a:schemeClr val="tx1"/>
+              </a:solidFill>
+              <a:latin typeface="メイリオ" panose="020B0604030504040204" pitchFamily="50" charset="-128"/>
+              <a:ea typeface="メイリオ" panose="020B0604030504040204" pitchFamily="50" charset="-128"/>
+              <a:cs typeface="メイリオ" panose="020B0604030504040204" pitchFamily="50" charset="-128"/>
+            </a:endParaRPr>
+          </a:p>
+        </p:txBody>
+      </p:sp>
+      <p:sp>
+        <p:nvSpPr>
+          <p:cNvPr id="66" name="Isosceles Triangle 65"/>
+          <p:cNvSpPr/>
+          <p:nvPr/>
+        </p:nvSpPr>
+        <p:spPr>
+          <a:xfrm rot="10800000">
+            <a:off x="1396006" y="3871065"/>
+            <a:ext cx="391886" cy="393374"/>
+          </a:xfrm>
+          <a:prstGeom prst="triangle">
+            <a:avLst/>
+          </a:prstGeom>
+          <a:solidFill>
+            <a:srgbClr val="2CA4F2"/>
+          </a:solidFill>
+          <a:ln w="28575">
+            <a:solidFill>
+              <a:schemeClr val="tx1">
+                <a:lumMod val="95000"/>
+                <a:lumOff val="5000"/>
+              </a:schemeClr>
+            </a:solidFill>
+          </a:ln>
+        </p:spPr>
+        <p:style>
+          <a:lnRef idx="2">
+            <a:schemeClr val="accent1">
+              <a:shade val="50000"/>
+            </a:schemeClr>
+          </a:lnRef>
+          <a:fillRef idx="1">
+            <a:schemeClr val="accent1"/>
+          </a:fillRef>
+          <a:effectRef idx="0">
+            <a:schemeClr val="accent1"/>
+          </a:effectRef>
+          <a:fontRef idx="minor">
+            <a:schemeClr val="lt1"/>
+          </a:fontRef>
+        </p:style>
+        <p:txBody>
+          <a:bodyPr rtlCol="0" anchor="ctr"/>
+          <a:lstStyle/>
+          <a:p>
+            <a:pPr algn="ctr"/>
+            <a:endParaRPr lang="en-US"/>
+          </a:p>
+        </p:txBody>
+      </p:sp>
+      <p:pic>
+        <p:nvPicPr>
+          <p:cNvPr id="68" name="Picture 67"/>
+          <p:cNvPicPr>
+            <a:picLocks noChangeAspect="1"/>
+          </p:cNvPicPr>
+          <p:nvPr/>
+        </p:nvPicPr>
+        <p:blipFill>
+          <a:blip r:embed="rId13" cstate="print">
+            <a:extLst>
+              <a:ext uri="{28A0092B-C50C-407E-A947-70E740481C1C}">
+                <a14:useLocalDpi xmlns:a14="http://schemas.microsoft.com/office/drawing/2010/main" val="0"/>
+              </a:ext>
+            </a:extLst>
+          </a:blip>
+          <a:stretch>
+            <a:fillRect/>
+          </a:stretch>
+        </p:blipFill>
+        <p:spPr>
+          <a:xfrm>
+            <a:off x="2355101" y="4294625"/>
+            <a:ext cx="663211" cy="712937"/>
+          </a:xfrm>
+          <a:prstGeom prst="rect">
+            <a:avLst/>
+          </a:prstGeom>
+        </p:spPr>
+      </p:pic>
+      <p:pic>
+        <p:nvPicPr>
+          <p:cNvPr id="67" name="Picture 2" descr="http://carrot-top.com/media/catalog/product/cache/1/image/9df78eab33525d08d6e5fb8d27136e95/a/s/as150_checkered.jpg"/>
+          <p:cNvPicPr>
+            <a:picLocks noChangeAspect="1" noChangeArrowheads="1"/>
+          </p:cNvPicPr>
+          <p:nvPr/>
+        </p:nvPicPr>
+        <p:blipFill rotWithShape="1">
+          <a:blip r:embed="rId14" cstate="print">
+            <a:extLst>
+              <a:ext uri="{28A0092B-C50C-407E-A947-70E740481C1C}">
+                <a14:useLocalDpi xmlns:a14="http://schemas.microsoft.com/office/drawing/2010/main" val="0"/>
+              </a:ext>
+            </a:extLst>
+          </a:blip>
+          <a:srcRect b="9440"/>
+          <a:stretch/>
+        </p:blipFill>
+        <p:spPr bwMode="auto">
+          <a:xfrm>
+            <a:off x="9678541" y="4092161"/>
+            <a:ext cx="740229" cy="670352"/>
+          </a:xfrm>
+          <a:prstGeom prst="rect">
+            <a:avLst/>
+          </a:prstGeom>
+          <a:noFill/>
+          <a:extLst>
+            <a:ext uri="{909E8E84-426E-40DD-AFC4-6F175D3DCCD1}">
+              <a14:hiddenFill xmlns:a14="http://schemas.microsoft.com/office/drawing/2010/main">
+                <a:solidFill>
+                  <a:srgbClr val="FFFFFF"/>
+                </a:solidFill>
+              </a14:hiddenFill>
+            </a:ext>
+          </a:extLst>
+        </p:spPr>
+      </p:pic>
+      <p:sp>
+        <p:nvSpPr>
+          <p:cNvPr id="57" name="Arc 56"/>
+          <p:cNvSpPr/>
+          <p:nvPr/>
+        </p:nvSpPr>
+        <p:spPr>
+          <a:xfrm>
+            <a:off x="9164496" y="947678"/>
+            <a:ext cx="588397" cy="633889"/>
+          </a:xfrm>
+          <a:prstGeom prst="arc">
+            <a:avLst/>
+          </a:prstGeom>
+          <a:ln w="19050">
+            <a:solidFill>
+              <a:schemeClr val="tx1"/>
+            </a:solidFill>
+          </a:ln>
+        </p:spPr>
+        <p:style>
+          <a:lnRef idx="1">
+            <a:schemeClr val="accent1"/>
+          </a:lnRef>
+          <a:fillRef idx="0">
+            <a:schemeClr val="accent1"/>
+          </a:fillRef>
+          <a:effectRef idx="0">
+            <a:schemeClr val="accent1"/>
+          </a:effectRef>
+          <a:fontRef idx="minor">
+            <a:schemeClr val="tx1"/>
+          </a:fontRef>
+        </p:style>
+        <p:txBody>
+          <a:bodyPr rtlCol="0" anchor="ctr"/>
+          <a:lstStyle/>
+          <a:p>
+            <a:pPr algn="ctr"/>
+            <a:endParaRPr lang="en-US"/>
+          </a:p>
+        </p:txBody>
+      </p:sp>
+      <p:cxnSp>
+        <p:nvCxnSpPr>
+          <p:cNvPr id="76" name="Straight Connector 75"/>
+          <p:cNvCxnSpPr>
+            <a:cxnSpLocks/>
+          </p:cNvCxnSpPr>
+          <p:nvPr/>
+        </p:nvCxnSpPr>
+        <p:spPr>
+          <a:xfrm flipH="1">
+            <a:off x="4050268" y="947678"/>
+            <a:ext cx="5408426" cy="0"/>
+          </a:xfrm>
+          <a:prstGeom prst="line">
+            <a:avLst/>
+          </a:prstGeom>
+          <a:ln w="19050">
+            <a:solidFill>
+              <a:schemeClr val="tx1"/>
+            </a:solidFill>
+          </a:ln>
+        </p:spPr>
+        <p:style>
+          <a:lnRef idx="1">
+            <a:schemeClr val="accent1"/>
+          </a:lnRef>
+          <a:fillRef idx="0">
+            <a:schemeClr val="accent1"/>
+          </a:fillRef>
+          <a:effectRef idx="0">
+            <a:schemeClr val="accent1"/>
+          </a:effectRef>
+          <a:fontRef idx="minor">
+            <a:schemeClr val="tx1"/>
+          </a:fontRef>
+        </p:style>
+      </p:cxnSp>
+      <p:pic>
+        <p:nvPicPr>
+          <p:cNvPr id="79" name="Picture 78"/>
+          <p:cNvPicPr>
+            <a:picLocks noChangeAspect="1"/>
+          </p:cNvPicPr>
+          <p:nvPr/>
+        </p:nvPicPr>
+        <p:blipFill>
+          <a:blip r:embed="rId15" cstate="print">
+            <a:extLst>
+              <a:ext uri="{28A0092B-C50C-407E-A947-70E740481C1C}">
+                <a14:useLocalDpi xmlns:a14="http://schemas.microsoft.com/office/drawing/2010/main" val="0"/>
+              </a:ext>
+            </a:extLst>
+          </a:blip>
+          <a:stretch>
+            <a:fillRect/>
+          </a:stretch>
+        </p:blipFill>
+        <p:spPr>
+          <a:xfrm>
+            <a:off x="5034032" y="263010"/>
+            <a:ext cx="590272" cy="590272"/>
+          </a:xfrm>
+          <a:prstGeom prst="rect">
+            <a:avLst/>
+          </a:prstGeom>
+        </p:spPr>
+      </p:pic>
+      <p:grpSp>
+        <p:nvGrpSpPr>
+          <p:cNvPr id="87" name="Group 86"/>
+          <p:cNvGrpSpPr/>
+          <p:nvPr/>
+        </p:nvGrpSpPr>
+        <p:grpSpPr>
+          <a:xfrm>
+            <a:off x="7807246" y="269656"/>
+            <a:ext cx="814966" cy="696565"/>
+            <a:chOff x="7738484" y="171095"/>
+            <a:chExt cx="956273" cy="804821"/>
+          </a:xfrm>
+        </p:grpSpPr>
+        <p:pic>
+          <p:nvPicPr>
+            <p:cNvPr id="89" name="Picture 88"/>
+            <p:cNvPicPr>
+              <a:picLocks noChangeAspect="1"/>
+            </p:cNvPicPr>
+            <p:nvPr/>
+          </p:nvPicPr>
+          <p:blipFill>
+            <a:blip r:embed="rId16" cstate="print">
+              <a:extLst>
+                <a:ext uri="{28A0092B-C50C-407E-A947-70E740481C1C}">
+                  <a14:useLocalDpi xmlns:a14="http://schemas.microsoft.com/office/drawing/2010/main" val="0"/>
+                </a:ext>
+              </a:extLst>
+            </a:blip>
+            <a:stretch>
+              <a:fillRect/>
+            </a:stretch>
+          </p:blipFill>
+          <p:spPr>
+            <a:xfrm>
+              <a:off x="7738484" y="177337"/>
+              <a:ext cx="798579" cy="798579"/>
+            </a:xfrm>
+            <a:prstGeom prst="rect">
+              <a:avLst/>
+            </a:prstGeom>
+          </p:spPr>
+        </p:pic>
+        <p:pic>
+          <p:nvPicPr>
+            <p:cNvPr id="90" name="Picture 89"/>
+            <p:cNvPicPr>
+              <a:picLocks noChangeAspect="1"/>
+            </p:cNvPicPr>
+            <p:nvPr/>
+          </p:nvPicPr>
+          <p:blipFill>
+            <a:blip r:embed="rId17" cstate="print">
+              <a:extLst>
+                <a:ext uri="{28A0092B-C50C-407E-A947-70E740481C1C}">
+                  <a14:useLocalDpi xmlns:a14="http://schemas.microsoft.com/office/drawing/2010/main" val="0"/>
+                </a:ext>
+              </a:extLst>
+            </a:blip>
+            <a:stretch>
+              <a:fillRect/>
+            </a:stretch>
+          </p:blipFill>
+          <p:spPr>
+            <a:xfrm>
+              <a:off x="7849616" y="263154"/>
+              <a:ext cx="566469" cy="566469"/>
+            </a:xfrm>
+            <a:prstGeom prst="rect">
+              <a:avLst/>
+            </a:prstGeom>
+          </p:spPr>
+        </p:pic>
+        <p:pic>
+          <p:nvPicPr>
+            <p:cNvPr id="91" name="Picture 90"/>
+            <p:cNvPicPr>
+              <a:picLocks noChangeAspect="1"/>
+            </p:cNvPicPr>
+            <p:nvPr/>
+          </p:nvPicPr>
+          <p:blipFill>
+            <a:blip r:embed="rId18" cstate="print">
+              <a:extLst>
+                <a:ext uri="{28A0092B-C50C-407E-A947-70E740481C1C}">
+                  <a14:useLocalDpi xmlns:a14="http://schemas.microsoft.com/office/drawing/2010/main" val="0"/>
+                </a:ext>
+              </a:extLst>
+            </a:blip>
+            <a:stretch>
+              <a:fillRect/>
+            </a:stretch>
+          </p:blipFill>
+          <p:spPr>
+            <a:xfrm>
+              <a:off x="8220291" y="171095"/>
+              <a:ext cx="474466" cy="474466"/>
+            </a:xfrm>
+            <a:prstGeom prst="rect">
+              <a:avLst/>
+            </a:prstGeom>
+          </p:spPr>
+        </p:pic>
+      </p:grpSp>
+      <p:sp>
+        <p:nvSpPr>
+          <p:cNvPr id="92" name="Rounded Rectangle 91"/>
+          <p:cNvSpPr/>
+          <p:nvPr/>
+        </p:nvSpPr>
+        <p:spPr>
+          <a:xfrm>
+            <a:off x="3329739" y="610570"/>
+            <a:ext cx="720529" cy="566057"/>
+          </a:xfrm>
+          <a:prstGeom prst="roundRect">
+            <a:avLst/>
+          </a:prstGeom>
+          <a:noFill/>
+          <a:ln w="38100">
+            <a:solidFill>
+              <a:srgbClr val="2CA4F2"/>
+            </a:solidFill>
+          </a:ln>
+        </p:spPr>
+        <p:style>
+          <a:lnRef idx="2">
+            <a:schemeClr val="accent1">
+              <a:shade val="50000"/>
+            </a:schemeClr>
+          </a:lnRef>
+          <a:fillRef idx="1">
+            <a:schemeClr val="accent1"/>
+          </a:fillRef>
+          <a:effectRef idx="0">
+            <a:schemeClr val="accent1"/>
+          </a:effectRef>
+          <a:fontRef idx="minor">
+            <a:schemeClr val="lt1"/>
+          </a:fontRef>
+        </p:style>
+        <p:txBody>
+          <a:bodyPr rtlCol="0" anchor="ctr"/>
+          <a:lstStyle/>
+          <a:p>
+            <a:pPr algn="ctr"/>
+            <a:r>
+              <a:rPr lang="ja-JP" altLang="en-US" sz="1400" b="1" i="1" dirty="0" smtClean="0">
+                <a:solidFill>
+                  <a:schemeClr val="tx1"/>
+                </a:solidFill>
+                <a:latin typeface="メイリオ" panose="020B0604030504040204" pitchFamily="50" charset="-128"/>
+                <a:ea typeface="メイリオ" panose="020B0604030504040204" pitchFamily="50" charset="-128"/>
+                <a:cs typeface="メイリオ" panose="020B0604030504040204" pitchFamily="50" charset="-128"/>
+              </a:rPr>
+              <a:t>開始</a:t>
+            </a:r>
+            <a:endParaRPr lang="en-US" sz="1400" b="1" i="1" dirty="0">
+              <a:solidFill>
+                <a:schemeClr val="tx1"/>
+              </a:solidFill>
+              <a:latin typeface="メイリオ" panose="020B0604030504040204" pitchFamily="50" charset="-128"/>
+              <a:ea typeface="メイリオ" panose="020B0604030504040204" pitchFamily="50" charset="-128"/>
+              <a:cs typeface="メイリオ" panose="020B0604030504040204" pitchFamily="50" charset="-128"/>
+            </a:endParaRPr>
+          </a:p>
+        </p:txBody>
+      </p:sp>
+      <p:sp>
+        <p:nvSpPr>
+          <p:cNvPr id="93" name="Isosceles Triangle 92"/>
+          <p:cNvSpPr/>
+          <p:nvPr/>
+        </p:nvSpPr>
+        <p:spPr>
+          <a:xfrm rot="10800000">
+            <a:off x="9556950" y="1759083"/>
+            <a:ext cx="391886" cy="393374"/>
+          </a:xfrm>
+          <a:prstGeom prst="triangle">
+            <a:avLst/>
+          </a:prstGeom>
+          <a:solidFill>
+            <a:srgbClr val="2CA4F2"/>
+          </a:solidFill>
+          <a:ln w="28575">
+            <a:solidFill>
+              <a:schemeClr val="tx1">
+                <a:lumMod val="95000"/>
+                <a:lumOff val="5000"/>
+              </a:schemeClr>
+            </a:solidFill>
+          </a:ln>
+        </p:spPr>
+        <p:style>
+          <a:lnRef idx="2">
+            <a:schemeClr val="accent1">
+              <a:shade val="50000"/>
+            </a:schemeClr>
+          </a:lnRef>
+          <a:fillRef idx="1">
+            <a:schemeClr val="accent1"/>
+          </a:fillRef>
+          <a:effectRef idx="0">
+            <a:schemeClr val="accent1"/>
+          </a:effectRef>
+          <a:fontRef idx="minor">
+            <a:schemeClr val="lt1"/>
+          </a:fontRef>
+        </p:style>
+        <p:txBody>
+          <a:bodyPr rtlCol="0" anchor="ctr"/>
+          <a:lstStyle/>
+          <a:p>
+            <a:pPr algn="ctr"/>
+            <a:endParaRPr lang="en-US"/>
+          </a:p>
+        </p:txBody>
+      </p:sp>
+      <p:sp>
+        <p:nvSpPr>
+          <p:cNvPr id="54" name="TextBox 39"/>
+          <p:cNvSpPr txBox="1"/>
+          <p:nvPr/>
+        </p:nvSpPr>
+        <p:spPr>
+          <a:xfrm>
+            <a:off x="4076210" y="1247275"/>
+            <a:ext cx="2485216" cy="600164"/>
+          </a:xfrm>
+          <a:prstGeom prst="rect">
+            <a:avLst/>
+          </a:prstGeom>
+          <a:noFill/>
+        </p:spPr>
+        <p:txBody>
+          <a:bodyPr wrap="square" rtlCol="0">
+            <a:spAutoFit/>
+          </a:bodyPr>
+          <a:lstStyle/>
+          <a:p>
+            <a:r>
+              <a:rPr lang="ja-JP" altLang="en-US" sz="1100" dirty="0" smtClean="0">
+                <a:latin typeface="メイリオ" panose="020B0604030504040204" pitchFamily="50" charset="-128"/>
+                <a:ea typeface="メイリオ" panose="020B0604030504040204" pitchFamily="50" charset="-128"/>
+                <a:cs typeface="メイリオ" panose="020B0604030504040204" pitchFamily="50" charset="-128"/>
+              </a:rPr>
+              <a:t>プロジェクトをキックオフし、すべての関係組織の窓口担当を紹介し換算に関する詳細情報を伝えます。</a:t>
+            </a:r>
+            <a:endParaRPr lang="sv-SE" sz="1100" dirty="0">
+              <a:latin typeface="メイリオ" panose="020B0604030504040204" pitchFamily="50" charset="-128"/>
+              <a:ea typeface="メイリオ" panose="020B0604030504040204" pitchFamily="50" charset="-128"/>
+              <a:cs typeface="メイリオ" panose="020B0604030504040204" pitchFamily="50" charset="-128"/>
+            </a:endParaRPr>
+          </a:p>
+        </p:txBody>
+      </p:sp>
+      <p:sp>
+        <p:nvSpPr>
+          <p:cNvPr id="55" name="TextBox 40"/>
+          <p:cNvSpPr txBox="1"/>
+          <p:nvPr/>
+        </p:nvSpPr>
+        <p:spPr>
+          <a:xfrm>
+            <a:off x="4097633" y="1006355"/>
+            <a:ext cx="2397260" cy="276999"/>
+          </a:xfrm>
+          <a:prstGeom prst="rect">
+            <a:avLst/>
+          </a:prstGeom>
+          <a:noFill/>
+        </p:spPr>
+        <p:txBody>
+          <a:bodyPr wrap="square" rtlCol="0">
+            <a:spAutoFit/>
+          </a:bodyPr>
+          <a:lstStyle/>
+          <a:p>
+            <a:pPr algn="ctr"/>
+            <a:r>
+              <a:rPr lang="ja-JP" altLang="en-US" sz="1200" b="1" dirty="0" smtClean="0">
+                <a:latin typeface="メイリオ" panose="020B0604030504040204" pitchFamily="50" charset="-128"/>
+                <a:ea typeface="メイリオ" panose="020B0604030504040204" pitchFamily="50" charset="-128"/>
+                <a:cs typeface="メイリオ" panose="020B0604030504040204" pitchFamily="50" charset="-128"/>
+              </a:rPr>
+              <a:t>立ち上げ時招集、ミーティング</a:t>
+            </a:r>
+            <a:endParaRPr lang="sv-SE" sz="1200" b="1" dirty="0">
+              <a:latin typeface="メイリオ" panose="020B0604030504040204" pitchFamily="50" charset="-128"/>
+              <a:ea typeface="メイリオ" panose="020B0604030504040204" pitchFamily="50" charset="-128"/>
+              <a:cs typeface="メイリオ" panose="020B0604030504040204" pitchFamily="50" charset="-128"/>
+            </a:endParaRPr>
+          </a:p>
+        </p:txBody>
+      </p:sp>
+      <p:sp>
+        <p:nvSpPr>
+          <p:cNvPr id="56" name="TextBox 48"/>
+          <p:cNvSpPr txBox="1"/>
+          <p:nvPr/>
+        </p:nvSpPr>
+        <p:spPr>
+          <a:xfrm>
+            <a:off x="6807289" y="1231556"/>
+            <a:ext cx="2712553" cy="784830"/>
+          </a:xfrm>
+          <a:prstGeom prst="rect">
+            <a:avLst/>
+          </a:prstGeom>
+          <a:noFill/>
+        </p:spPr>
+        <p:txBody>
+          <a:bodyPr wrap="square" rtlCol="0">
+            <a:spAutoFit/>
+          </a:bodyPr>
+          <a:lstStyle>
+            <a:defPPr>
+              <a:defRPr lang="sv-SE"/>
+            </a:defPPr>
+            <a:lvl1pPr>
+              <a:defRPr sz="1100">
+                <a:latin typeface="メイリオ" panose="020B0604030504040204" pitchFamily="50" charset="-128"/>
+                <a:ea typeface="メイリオ" panose="020B0604030504040204" pitchFamily="50" charset="-128"/>
+                <a:cs typeface="メイリオ" panose="020B0604030504040204" pitchFamily="50" charset="-128"/>
+              </a:defRPr>
+            </a:lvl1pPr>
+          </a:lstStyle>
+          <a:p>
+            <a:r>
+              <a:rPr lang="ja-JP" altLang="en-US" dirty="0"/>
+              <a:t>ソフトウェアの電子署名</a:t>
+            </a:r>
+            <a:r>
+              <a:rPr lang="en-US" altLang="ja-JP" dirty="0">
+                <a:solidFill>
+                  <a:srgbClr val="FF0000"/>
+                </a:solidFill>
+              </a:rPr>
+              <a:t>*</a:t>
+            </a:r>
+            <a:r>
+              <a:rPr lang="ja-JP" altLang="en-US" dirty="0"/>
+              <a:t>を収集するためにコマンドライン インターフェースがインストール方法と実行方法の説明と共</a:t>
+            </a:r>
+            <a:r>
+              <a:rPr lang="ja-JP" altLang="en-US" dirty="0" smtClean="0"/>
+              <a:t>に対象企業</a:t>
+            </a:r>
+            <a:r>
+              <a:rPr lang="ja-JP" altLang="en-US" dirty="0"/>
+              <a:t>に送られます。</a:t>
+            </a:r>
+            <a:endParaRPr lang="sv-SE" dirty="0"/>
+          </a:p>
+        </p:txBody>
+      </p:sp>
+      <p:sp>
+        <p:nvSpPr>
+          <p:cNvPr id="64" name="TextBox 49"/>
+          <p:cNvSpPr txBox="1"/>
+          <p:nvPr/>
+        </p:nvSpPr>
+        <p:spPr>
+          <a:xfrm>
+            <a:off x="6930892" y="1006355"/>
+            <a:ext cx="2397260" cy="276999"/>
+          </a:xfrm>
+          <a:prstGeom prst="rect">
+            <a:avLst/>
+          </a:prstGeom>
+          <a:noFill/>
+        </p:spPr>
+        <p:txBody>
+          <a:bodyPr wrap="square" rtlCol="0">
+            <a:spAutoFit/>
+          </a:bodyPr>
+          <a:lstStyle/>
+          <a:p>
+            <a:pPr algn="ctr"/>
+            <a:r>
+              <a:rPr lang="ja-JP" altLang="en-US" sz="1200" b="1" dirty="0" smtClean="0">
+                <a:latin typeface="メイリオ" panose="020B0604030504040204" pitchFamily="50" charset="-128"/>
+                <a:ea typeface="メイリオ" panose="020B0604030504040204" pitchFamily="50" charset="-128"/>
+                <a:cs typeface="メイリオ" panose="020B0604030504040204" pitchFamily="50" charset="-128"/>
+              </a:rPr>
+              <a:t>フィンガープリント収集ツール</a:t>
+            </a:r>
+            <a:endParaRPr lang="sv-SE" sz="1200" b="1" dirty="0">
+              <a:latin typeface="メイリオ" panose="020B0604030504040204" pitchFamily="50" charset="-128"/>
+              <a:ea typeface="メイリオ" panose="020B0604030504040204" pitchFamily="50" charset="-128"/>
+              <a:cs typeface="メイリオ" panose="020B0604030504040204" pitchFamily="50" charset="-128"/>
+            </a:endParaRPr>
+          </a:p>
+        </p:txBody>
+      </p:sp>
+      <p:sp>
+        <p:nvSpPr>
+          <p:cNvPr id="69" name="TextBox 41"/>
+          <p:cNvSpPr txBox="1"/>
+          <p:nvPr/>
+        </p:nvSpPr>
+        <p:spPr>
+          <a:xfrm>
+            <a:off x="8862290" y="213476"/>
+            <a:ext cx="1577501" cy="669414"/>
+          </a:xfrm>
+          <a:prstGeom prst="rect">
+            <a:avLst/>
+          </a:prstGeom>
+          <a:noFill/>
+          <a:ln w="12700">
+            <a:solidFill>
+              <a:schemeClr val="tx1">
+                <a:lumMod val="50000"/>
+                <a:lumOff val="50000"/>
+              </a:schemeClr>
+            </a:solidFill>
+            <a:prstDash val="sysDash"/>
+          </a:ln>
+        </p:spPr>
+        <p:txBody>
+          <a:bodyPr wrap="square" rtlCol="0">
+            <a:spAutoFit/>
+          </a:bodyPr>
+          <a:lstStyle/>
+          <a:p>
+            <a:r>
+              <a:rPr lang="en-US" sz="1050" i="1" dirty="0" smtClean="0">
+                <a:solidFill>
+                  <a:srgbClr val="FF0000"/>
+                </a:solidFill>
+                <a:latin typeface="メイリオ" panose="020B0604030504040204" pitchFamily="50" charset="-128"/>
+                <a:ea typeface="メイリオ" panose="020B0604030504040204" pitchFamily="50" charset="-128"/>
+                <a:cs typeface="メイリオ" panose="020B0604030504040204" pitchFamily="50" charset="-128"/>
+              </a:rPr>
+              <a:t>*</a:t>
+            </a:r>
+            <a:r>
+              <a:rPr lang="en-US" sz="900" i="1" dirty="0" smtClean="0">
+                <a:solidFill>
+                  <a:srgbClr val="FF0000"/>
+                </a:solidFill>
+                <a:latin typeface="メイリオ" panose="020B0604030504040204" pitchFamily="50" charset="-128"/>
+                <a:ea typeface="メイリオ" panose="020B0604030504040204" pitchFamily="50" charset="-128"/>
+                <a:cs typeface="メイリオ" panose="020B0604030504040204" pitchFamily="50" charset="-128"/>
+              </a:rPr>
+              <a:t> </a:t>
+            </a:r>
+            <a:r>
+              <a:rPr lang="ja-JP" altLang="en-US" sz="900" i="1" dirty="0" smtClean="0">
+                <a:latin typeface="メイリオ" panose="020B0604030504040204" pitchFamily="50" charset="-128"/>
+                <a:ea typeface="メイリオ" panose="020B0604030504040204" pitchFamily="50" charset="-128"/>
+                <a:cs typeface="メイリオ" panose="020B0604030504040204" pitchFamily="50" charset="-128"/>
+              </a:rPr>
+              <a:t>監査人によって対応できないものがあります。監査サービスプロバイダに確認ください。</a:t>
+            </a:r>
+            <a:endParaRPr lang="en-US" sz="900" i="1" dirty="0" smtClean="0">
+              <a:latin typeface="メイリオ" panose="020B0604030504040204" pitchFamily="50" charset="-128"/>
+              <a:ea typeface="メイリオ" panose="020B0604030504040204" pitchFamily="50" charset="-128"/>
+              <a:cs typeface="メイリオ" panose="020B0604030504040204" pitchFamily="50" charset="-128"/>
+            </a:endParaRPr>
+          </a:p>
+        </p:txBody>
+      </p:sp>
+    </p:spTree>
+    <p:extLst>
+      <p:ext uri="{BB962C8B-B14F-4D97-AF65-F5344CB8AC3E}">
+        <p14:creationId xmlns:p14="http://schemas.microsoft.com/office/powerpoint/2010/main" val="3673389830"/>
+      </p:ext>
+    </p:extLst>
+  </p:cSld>
+  <p:clrMapOvr>
+    <a:masterClrMapping/>
+  </p:clrMapOvr>
+  <p:transition spd="slow">
+    <p:push dir="u"/>
+  </p:transition>
+  <p:timing>
+    <p:tnLst>
+      <p:par>
+        <p:cTn id="1" dur="indefinite" restart="never" nodeType="tmRoot"/>
+      </p:par>
+    </p:tnLst>
+  </p:timing>
+</p:sld>
+</file>
+
 <file path=ppt/slides/slide2.xml><?xml version="1.0" encoding="utf-8"?>
 <p:sld xmlns:a="http://schemas.openxmlformats.org/drawingml/2006/main" xmlns:r="http://schemas.openxmlformats.org/officeDocument/2006/relationships" xmlns:p="http://schemas.openxmlformats.org/presentationml/2006/main">
   <p:cSld>
@@ -10578,177 +12742,258 @@
           </a:p>
         </p:txBody>
       </p:sp>
-      <p:grpSp>
-        <p:nvGrpSpPr>
-          <p:cNvPr id="7" name="Group 6"/>
-          <p:cNvGrpSpPr/>
-          <p:nvPr/>
-        </p:nvGrpSpPr>
-        <p:grpSpPr>
+      <p:sp>
+        <p:nvSpPr>
+          <p:cNvPr id="2" name="Rectangle 1"/>
+          <p:cNvSpPr/>
+          <p:nvPr/>
+        </p:nvSpPr>
+        <p:spPr>
+          <a:xfrm>
+            <a:off x="4352925" y="3914775"/>
+            <a:ext cx="2438400" cy="1485900"/>
+          </a:xfrm>
+          <a:prstGeom prst="rect">
+            <a:avLst/>
+          </a:prstGeom>
+        </p:spPr>
+        <p:style>
+          <a:lnRef idx="0">
+            <a:schemeClr val="accent1"/>
+          </a:lnRef>
+          <a:fillRef idx="3">
+            <a:schemeClr val="accent1"/>
+          </a:fillRef>
+          <a:effectRef idx="3">
+            <a:schemeClr val="accent1"/>
+          </a:effectRef>
+          <a:fontRef idx="minor">
+            <a:schemeClr val="lt1"/>
+          </a:fontRef>
+        </p:style>
+        <p:txBody>
+          <a:bodyPr rtlCol="0" anchor="ctr"/>
+          <a:lstStyle/>
+          <a:p>
+            <a:pPr algn="ctr"/>
+            <a:endParaRPr lang="en-US"/>
+          </a:p>
+        </p:txBody>
+      </p:sp>
+      <p:sp>
+        <p:nvSpPr>
+          <p:cNvPr id="3" name="Rounded Rectangle 2"/>
+          <p:cNvSpPr/>
+          <p:nvPr/>
+        </p:nvSpPr>
+        <p:spPr>
           <a:xfrm>
             <a:off x="3448050" y="2286000"/>
-            <a:ext cx="3343275" cy="3114675"/>
-            <a:chOff x="3267075" y="2505075"/>
-            <a:chExt cx="3343275" cy="3114675"/>
-          </a:xfrm>
-        </p:grpSpPr>
-        <p:sp>
-          <p:nvSpPr>
-            <p:cNvPr id="2" name="Rectangle 1"/>
-            <p:cNvSpPr/>
-            <p:nvPr/>
-          </p:nvSpPr>
-          <p:spPr>
-            <a:xfrm>
-              <a:off x="4171950" y="4133850"/>
-              <a:ext cx="2438400" cy="1485900"/>
-            </a:xfrm>
-            <a:prstGeom prst="rect">
-              <a:avLst/>
-            </a:prstGeom>
-          </p:spPr>
-          <p:style>
-            <a:lnRef idx="0">
-              <a:schemeClr val="accent1"/>
-            </a:lnRef>
-            <a:fillRef idx="3">
-              <a:schemeClr val="accent1"/>
-            </a:fillRef>
-            <a:effectRef idx="3">
-              <a:schemeClr val="accent1"/>
-            </a:effectRef>
-            <a:fontRef idx="minor">
-              <a:schemeClr val="lt1"/>
-            </a:fontRef>
-          </p:style>
-          <p:txBody>
-            <a:bodyPr rtlCol="0" anchor="ctr"/>
-            <a:lstStyle/>
-            <a:p>
-              <a:pPr algn="ctr"/>
-              <a:endParaRPr lang="en-US"/>
-            </a:p>
-          </p:txBody>
-        </p:sp>
-        <p:sp>
-          <p:nvSpPr>
-            <p:cNvPr id="3" name="Rounded Rectangle 2"/>
-            <p:cNvSpPr/>
-            <p:nvPr/>
-          </p:nvSpPr>
-          <p:spPr>
-            <a:xfrm>
-              <a:off x="3267075" y="2505075"/>
-              <a:ext cx="1390650" cy="723900"/>
-            </a:xfrm>
-            <a:prstGeom prst="roundRect">
-              <a:avLst/>
-            </a:prstGeom>
-          </p:spPr>
-          <p:style>
-            <a:lnRef idx="0">
-              <a:schemeClr val="accent6"/>
-            </a:lnRef>
-            <a:fillRef idx="3">
-              <a:schemeClr val="accent6"/>
-            </a:fillRef>
-            <a:effectRef idx="3">
-              <a:schemeClr val="accent6"/>
-            </a:effectRef>
-            <a:fontRef idx="minor">
-              <a:schemeClr val="lt1"/>
-            </a:fontRef>
-          </p:style>
-          <p:txBody>
-            <a:bodyPr rtlCol="0" anchor="ctr"/>
-            <a:lstStyle/>
-            <a:p>
-              <a:pPr algn="ctr"/>
-              <a:endParaRPr lang="en-US"/>
-            </a:p>
-          </p:txBody>
-        </p:sp>
-        <p:sp>
-          <p:nvSpPr>
-            <p:cNvPr id="6" name="Rounded Rectangle 5"/>
-            <p:cNvSpPr/>
-            <p:nvPr/>
-          </p:nvSpPr>
-          <p:spPr>
-            <a:xfrm>
-              <a:off x="4695825" y="4514850"/>
-              <a:ext cx="1390650" cy="723900"/>
-            </a:xfrm>
-            <a:prstGeom prst="roundRect">
-              <a:avLst/>
-            </a:prstGeom>
-          </p:spPr>
-          <p:style>
-            <a:lnRef idx="0">
-              <a:schemeClr val="accent6"/>
-            </a:lnRef>
-            <a:fillRef idx="3">
-              <a:schemeClr val="accent6"/>
-            </a:fillRef>
-            <a:effectRef idx="3">
-              <a:schemeClr val="accent6"/>
-            </a:effectRef>
-            <a:fontRef idx="minor">
-              <a:schemeClr val="lt1"/>
-            </a:fontRef>
-          </p:style>
-          <p:txBody>
-            <a:bodyPr rtlCol="0" anchor="ctr"/>
-            <a:lstStyle/>
-            <a:p>
-              <a:pPr algn="ctr"/>
-              <a:endParaRPr lang="en-US"/>
-            </a:p>
-          </p:txBody>
-        </p:sp>
-        <p:sp>
-          <p:nvSpPr>
-            <p:cNvPr id="5" name="Bent Arrow 4"/>
-            <p:cNvSpPr/>
-            <p:nvPr/>
-          </p:nvSpPr>
-          <p:spPr>
-            <a:xfrm rot="5400000">
-              <a:off x="4619625" y="3019425"/>
-              <a:ext cx="1171575" cy="733425"/>
-            </a:xfrm>
-            <a:prstGeom prst="bentArrow">
-              <a:avLst/>
-            </a:prstGeom>
-          </p:spPr>
-          <p:style>
-            <a:lnRef idx="0">
-              <a:schemeClr val="accent3"/>
-            </a:lnRef>
-            <a:fillRef idx="3">
-              <a:schemeClr val="accent3"/>
-            </a:fillRef>
-            <a:effectRef idx="3">
-              <a:schemeClr val="accent3"/>
-            </a:effectRef>
-            <a:fontRef idx="minor">
-              <a:schemeClr val="lt1"/>
-            </a:fontRef>
-          </p:style>
-          <p:txBody>
-            <a:bodyPr rtlCol="0" anchor="ctr"/>
-            <a:lstStyle/>
-            <a:p>
-              <a:pPr algn="ctr"/>
-              <a:endParaRPr lang="en-US">
-                <a:solidFill>
-                  <a:schemeClr val="tx1"/>
-                </a:solidFill>
-              </a:endParaRPr>
-            </a:p>
-          </p:txBody>
-        </p:sp>
-      </p:grpSp>
+            <a:ext cx="1390650" cy="723900"/>
+          </a:xfrm>
+          <a:prstGeom prst="roundRect">
+            <a:avLst/>
+          </a:prstGeom>
+        </p:spPr>
+        <p:style>
+          <a:lnRef idx="0">
+            <a:schemeClr val="accent6"/>
+          </a:lnRef>
+          <a:fillRef idx="3">
+            <a:schemeClr val="accent6"/>
+          </a:fillRef>
+          <a:effectRef idx="3">
+            <a:schemeClr val="accent6"/>
+          </a:effectRef>
+          <a:fontRef idx="minor">
+            <a:schemeClr val="lt1"/>
+          </a:fontRef>
+        </p:style>
+        <p:txBody>
+          <a:bodyPr rtlCol="0" anchor="ctr"/>
+          <a:lstStyle/>
+          <a:p>
+            <a:pPr algn="ctr"/>
+            <a:endParaRPr lang="en-US"/>
+          </a:p>
+        </p:txBody>
+      </p:sp>
+      <p:sp>
+        <p:nvSpPr>
+          <p:cNvPr id="6" name="Rounded Rectangle 5"/>
+          <p:cNvSpPr/>
+          <p:nvPr/>
+        </p:nvSpPr>
+        <p:spPr>
+          <a:xfrm>
+            <a:off x="4876800" y="4295775"/>
+            <a:ext cx="1390650" cy="723900"/>
+          </a:xfrm>
+          <a:prstGeom prst="roundRect">
+            <a:avLst/>
+          </a:prstGeom>
+        </p:spPr>
+        <p:style>
+          <a:lnRef idx="0">
+            <a:schemeClr val="accent6"/>
+          </a:lnRef>
+          <a:fillRef idx="3">
+            <a:schemeClr val="accent6"/>
+          </a:fillRef>
+          <a:effectRef idx="3">
+            <a:schemeClr val="accent6"/>
+          </a:effectRef>
+          <a:fontRef idx="minor">
+            <a:schemeClr val="lt1"/>
+          </a:fontRef>
+        </p:style>
+        <p:txBody>
+          <a:bodyPr rtlCol="0" anchor="ctr"/>
+          <a:lstStyle/>
+          <a:p>
+            <a:pPr algn="ctr"/>
+            <a:endParaRPr lang="en-US"/>
+          </a:p>
+        </p:txBody>
+      </p:sp>
+      <p:sp>
+        <p:nvSpPr>
+          <p:cNvPr id="5" name="Bent Arrow 4"/>
+          <p:cNvSpPr/>
+          <p:nvPr/>
+        </p:nvSpPr>
+        <p:spPr>
+          <a:xfrm rot="5400000">
+            <a:off x="4800600" y="2800350"/>
+            <a:ext cx="1171575" cy="733425"/>
+          </a:xfrm>
+          <a:prstGeom prst="bentArrow">
+            <a:avLst/>
+          </a:prstGeom>
+        </p:spPr>
+        <p:style>
+          <a:lnRef idx="0">
+            <a:schemeClr val="accent3"/>
+          </a:lnRef>
+          <a:fillRef idx="3">
+            <a:schemeClr val="accent3"/>
+          </a:fillRef>
+          <a:effectRef idx="3">
+            <a:schemeClr val="accent3"/>
+          </a:effectRef>
+          <a:fontRef idx="minor">
+            <a:schemeClr val="lt1"/>
+          </a:fontRef>
+        </p:style>
+        <p:txBody>
+          <a:bodyPr rtlCol="0" anchor="ctr"/>
+          <a:lstStyle/>
+          <a:p>
+            <a:pPr algn="ctr"/>
+            <a:endParaRPr lang="en-US">
+              <a:solidFill>
+                <a:schemeClr val="tx1"/>
+              </a:solidFill>
+            </a:endParaRPr>
+          </a:p>
+        </p:txBody>
+      </p:sp>
+      <p:sp>
+        <p:nvSpPr>
+          <p:cNvPr id="10" name="Rounded Rectangle 2"/>
+          <p:cNvSpPr/>
+          <p:nvPr/>
+        </p:nvSpPr>
+        <p:spPr>
+          <a:xfrm>
+            <a:off x="3448050" y="2286000"/>
+            <a:ext cx="1390650" cy="723900"/>
+          </a:xfrm>
+          <a:prstGeom prst="roundRect">
+            <a:avLst/>
+          </a:prstGeom>
+          <a:pattFill prst="pct5">
+            <a:fgClr>
+              <a:srgbClr val="FFFFFF"/>
+            </a:fgClr>
+            <a:bgClr>
+              <a:schemeClr val="accent6">
+                <a:lumMod val="75000"/>
+              </a:schemeClr>
+            </a:bgClr>
+          </a:pattFill>
+        </p:spPr>
+        <p:style>
+          <a:lnRef idx="0">
+            <a:schemeClr val="accent6"/>
+          </a:lnRef>
+          <a:fillRef idx="3">
+            <a:schemeClr val="accent6"/>
+          </a:fillRef>
+          <a:effectRef idx="3">
+            <a:schemeClr val="accent6"/>
+          </a:effectRef>
+          <a:fontRef idx="minor">
+            <a:schemeClr val="lt1"/>
+          </a:fontRef>
+        </p:style>
+        <p:txBody>
+          <a:bodyPr rtlCol="0" anchor="ctr"/>
+          <a:lstStyle/>
+          <a:p>
+            <a:pPr algn="ctr"/>
+            <a:endParaRPr lang="en-US"/>
+          </a:p>
+        </p:txBody>
+      </p:sp>
+      <p:sp>
+        <p:nvSpPr>
+          <p:cNvPr id="11" name="Rounded Rectangle 2"/>
+          <p:cNvSpPr/>
+          <p:nvPr/>
+        </p:nvSpPr>
+        <p:spPr>
+          <a:xfrm>
+            <a:off x="4876800" y="4305424"/>
+            <a:ext cx="1390650" cy="723900"/>
+          </a:xfrm>
+          <a:prstGeom prst="roundRect">
+            <a:avLst/>
+          </a:prstGeom>
+          <a:pattFill prst="pct5">
+            <a:fgClr>
+              <a:srgbClr val="FFFFFF"/>
+            </a:fgClr>
+            <a:bgClr>
+              <a:schemeClr val="accent6">
+                <a:lumMod val="75000"/>
+              </a:schemeClr>
+            </a:bgClr>
+          </a:pattFill>
+        </p:spPr>
+        <p:style>
+          <a:lnRef idx="0">
+            <a:schemeClr val="accent6"/>
+          </a:lnRef>
+          <a:fillRef idx="3">
+            <a:schemeClr val="accent6"/>
+          </a:fillRef>
+          <a:effectRef idx="3">
+            <a:schemeClr val="accent6"/>
+          </a:effectRef>
+          <a:fontRef idx="minor">
+            <a:schemeClr val="lt1"/>
+          </a:fontRef>
+        </p:style>
+        <p:txBody>
+          <a:bodyPr rtlCol="0" anchor="ctr"/>
+          <a:lstStyle/>
+          <a:p>
+            <a:pPr algn="ctr"/>
+            <a:endParaRPr lang="en-US"/>
+          </a:p>
+        </p:txBody>
+      </p:sp>
     </p:spTree>
     <p:extLst>
       <p:ext uri="{BB962C8B-B14F-4D97-AF65-F5344CB8AC3E}">
@@ -11016,6 +13261,102 @@
           </a:p>
         </p:txBody>
       </p:sp>
+      <p:sp>
+        <p:nvSpPr>
+          <p:cNvPr id="10" name="Rounded Rectangle 2"/>
+          <p:cNvSpPr/>
+          <p:nvPr/>
+        </p:nvSpPr>
+        <p:spPr>
+          <a:xfrm>
+            <a:off x="2134791" y="2432191"/>
+            <a:ext cx="1390650" cy="723900"/>
+          </a:xfrm>
+          <a:prstGeom prst="roundRect">
+            <a:avLst/>
+          </a:prstGeom>
+          <a:pattFill prst="pct5">
+            <a:fgClr>
+              <a:srgbClr val="FFFFFF"/>
+            </a:fgClr>
+            <a:bgClr>
+              <a:schemeClr val="accent6">
+                <a:lumMod val="75000"/>
+              </a:schemeClr>
+            </a:bgClr>
+          </a:pattFill>
+        </p:spPr>
+        <p:style>
+          <a:lnRef idx="0">
+            <a:schemeClr val="accent6"/>
+          </a:lnRef>
+          <a:fillRef idx="3">
+            <a:schemeClr val="accent6"/>
+          </a:fillRef>
+          <a:effectRef idx="3">
+            <a:schemeClr val="accent6"/>
+          </a:effectRef>
+          <a:fontRef idx="minor">
+            <a:schemeClr val="lt1"/>
+          </a:fontRef>
+        </p:style>
+        <p:txBody>
+          <a:bodyPr rtlCol="0" anchor="ctr"/>
+          <a:lstStyle/>
+          <a:p>
+            <a:pPr algn="ctr"/>
+            <a:endParaRPr lang="en-US"/>
+          </a:p>
+        </p:txBody>
+      </p:sp>
+      <p:sp>
+        <p:nvSpPr>
+          <p:cNvPr id="11" name="Rectangle 7"/>
+          <p:cNvSpPr/>
+          <p:nvPr/>
+        </p:nvSpPr>
+        <p:spPr>
+          <a:xfrm>
+            <a:off x="3362700" y="4143750"/>
+            <a:ext cx="819150" cy="1485900"/>
+          </a:xfrm>
+          <a:prstGeom prst="rect">
+            <a:avLst/>
+          </a:prstGeom>
+          <a:pattFill prst="pct5">
+            <a:fgClr>
+              <a:srgbClr val="FFFFFF"/>
+            </a:fgClr>
+            <a:bgClr>
+              <a:schemeClr val="accent6">
+                <a:lumMod val="75000"/>
+              </a:schemeClr>
+            </a:bgClr>
+          </a:pattFill>
+        </p:spPr>
+        <p:style>
+          <a:lnRef idx="0">
+            <a:schemeClr val="accent6"/>
+          </a:lnRef>
+          <a:fillRef idx="3">
+            <a:schemeClr val="accent6"/>
+          </a:fillRef>
+          <a:effectRef idx="3">
+            <a:schemeClr val="accent6"/>
+          </a:effectRef>
+          <a:fontRef idx="minor">
+            <a:schemeClr val="lt1"/>
+          </a:fontRef>
+        </p:style>
+        <p:txBody>
+          <a:bodyPr rtlCol="0" anchor="ctr"/>
+          <a:lstStyle/>
+          <a:p>
+            <a:pPr algn="ctr"/>
+            <a:endParaRPr lang="en-US"/>
+          </a:p>
+        </p:txBody>
+      </p:sp>
     </p:spTree>
     <p:extLst>
       <p:ext uri="{BB962C8B-B14F-4D97-AF65-F5344CB8AC3E}">
@@ -11232,6 +13573,16 @@
           <a:prstGeom prst="roundRect">
             <a:avLst/>
           </a:prstGeom>
+          <a:pattFill prst="pct5">
+            <a:fgClr>
+              <a:srgbClr val="FFFFFF"/>
+            </a:fgClr>
+            <a:bgClr>
+              <a:schemeClr val="accent6">
+                <a:lumMod val="75000"/>
+              </a:schemeClr>
+            </a:bgClr>
+          </a:pattFill>
         </p:spPr>
         <p:style>
           <a:lnRef idx="0">
@@ -11270,6 +13621,16 @@
           <a:prstGeom prst="roundRect">
             <a:avLst/>
           </a:prstGeom>
+          <a:pattFill prst="pct5">
+            <a:fgClr>
+              <a:srgbClr val="FFFFFF"/>
+            </a:fgClr>
+            <a:bgClr>
+              <a:schemeClr val="accent6">
+                <a:lumMod val="75000"/>
+              </a:schemeClr>
+            </a:bgClr>
+          </a:pattFill>
         </p:spPr>
         <p:style>
           <a:lnRef idx="0">
@@ -12836,18 +15197,7 @@
                 <a:ea typeface="メイリオ" panose="020B0604030504040204" pitchFamily="50" charset="-128"/>
                 <a:cs typeface="メイリオ" panose="020B0604030504040204" pitchFamily="50" charset="-128"/>
               </a:rPr>
-              <a:t>）</a:t>
-            </a:r>
-            <a:r>
-              <a:rPr lang="ja-JP" altLang="en-US" sz="1000" b="1" dirty="0">
-                <a:solidFill>
-                  <a:srgbClr val="000000"/>
-                </a:solidFill>
-                <a:latin typeface="メイリオ" panose="020B0604030504040204" pitchFamily="50" charset="-128"/>
-                <a:ea typeface="メイリオ" panose="020B0604030504040204" pitchFamily="50" charset="-128"/>
-                <a:cs typeface="メイリオ" panose="020B0604030504040204" pitchFamily="50" charset="-128"/>
-              </a:rPr>
-              <a:t>：</a:t>
+              <a:t>）：</a:t>
             </a:r>
             <a:endParaRPr lang="en-US" sz="1000" b="1" dirty="0">
               <a:solidFill>
@@ -18651,7 +21001,7 @@
         </p:nvSpPr>
         <p:spPr>
           <a:xfrm>
-            <a:off x="8346563" y="1160737"/>
+            <a:off x="8346563" y="1148862"/>
             <a:ext cx="588397" cy="633889"/>
           </a:xfrm>
           <a:prstGeom prst="arc">
@@ -18697,9 +21047,9 @@
           <p:nvPr/>
         </p:nvCxnSpPr>
         <p:spPr>
-          <a:xfrm flipH="1" flipV="1">
-            <a:off x="2760184" y="1152576"/>
-            <a:ext cx="5880577" cy="8161"/>
+          <a:xfrm flipH="1">
+            <a:off x="2760184" y="1148862"/>
+            <a:ext cx="5880577" cy="3714"/>
           </a:xfrm>
           <a:prstGeom prst="line">
             <a:avLst/>
@@ -19814,7 +22164,7 @@
                 <a14:useLocalDpi xmlns:a14="http://schemas.microsoft.com/office/drawing/2010/main" val="0"/>
               </a:ext>
               <a:ext uri="{96DAC541-7B7A-43D3-8B79-37D633B846F1}">
-                <asvg:svgBlip xmlns:asvg="http://schemas.microsoft.com/office/drawing/2016/SVG/main" xmlns="" r:embed="rId25"/>
+                <asvg:svgBlip xmlns="" xmlns:asvg="http://schemas.microsoft.com/office/drawing/2016/SVG/main" r:embed="rId25"/>
               </a:ext>
             </a:extLst>
           </a:blip>
@@ -20139,7 +22489,7 @@
         </p:nvSpPr>
         <p:spPr>
           <a:xfrm>
-            <a:off x="8346563" y="1160737"/>
+            <a:off x="8346563" y="1148862"/>
             <a:ext cx="588397" cy="633889"/>
           </a:xfrm>
           <a:prstGeom prst="arc">
@@ -20185,9 +22535,9 @@
           <p:nvPr/>
         </p:nvCxnSpPr>
         <p:spPr>
-          <a:xfrm flipH="1" flipV="1">
-            <a:off x="2760184" y="1152576"/>
-            <a:ext cx="5880577" cy="8161"/>
+          <a:xfrm flipH="1">
+            <a:off x="2760184" y="1148862"/>
+            <a:ext cx="5880577" cy="3714"/>
           </a:xfrm>
           <a:prstGeom prst="line">
             <a:avLst/>
@@ -20379,14 +22729,13 @@
           <p:cNvPr id="16" name="Straight Connector 15"/>
           <p:cNvCxnSpPr>
             <a:cxnSpLocks/>
-            <a:stCxn id="29" idx="0"/>
           </p:cNvCxnSpPr>
           <p:nvPr/>
         </p:nvCxnSpPr>
         <p:spPr>
-          <a:xfrm flipH="1">
-            <a:off x="2450730" y="3487103"/>
-            <a:ext cx="856" cy="1517445"/>
+          <a:xfrm>
+            <a:off x="2463461" y="3487103"/>
+            <a:ext cx="0" cy="1720278"/>
           </a:xfrm>
           <a:prstGeom prst="line">
             <a:avLst/>
@@ -20729,49 +23078,6 @@
               <a:t>。</a:t>
             </a:r>
             <a:endParaRPr lang="sv-SE" dirty="0"/>
-          </a:p>
-        </p:txBody>
-      </p:sp>
-      <p:sp>
-        <p:nvSpPr>
-          <p:cNvPr id="66" name="Arc 65"/>
-          <p:cNvSpPr/>
-          <p:nvPr/>
-        </p:nvSpPr>
-        <p:spPr>
-          <a:xfrm rot="10800000">
-            <a:off x="2451029" y="4433911"/>
-            <a:ext cx="590769" cy="1057212"/>
-          </a:xfrm>
-          <a:prstGeom prst="arc">
-            <a:avLst/>
-          </a:prstGeom>
-          <a:ln w="19050">
-            <a:solidFill>
-              <a:schemeClr val="tx1"/>
-            </a:solidFill>
-          </a:ln>
-        </p:spPr>
-        <p:style>
-          <a:lnRef idx="1">
-            <a:schemeClr val="accent1"/>
-          </a:lnRef>
-          <a:fillRef idx="0">
-            <a:schemeClr val="accent1"/>
-          </a:fillRef>
-          <a:effectRef idx="0">
-            <a:schemeClr val="accent1"/>
-          </a:effectRef>
-          <a:fontRef idx="minor">
-            <a:schemeClr val="tx1"/>
-          </a:fontRef>
-        </p:style>
-        <p:txBody>
-          <a:bodyPr rtlCol="0" anchor="ctr"/>
-          <a:lstStyle/>
-          <a:p>
-            <a:pPr algn="ctr"/>
-            <a:endParaRPr lang="en-US"/>
           </a:p>
         </p:txBody>
       </p:sp>
@@ -21093,7 +23399,7 @@
                 <a14:useLocalDpi xmlns:a14="http://schemas.microsoft.com/office/drawing/2010/main" val="0"/>
               </a:ext>
               <a:ext uri="{96DAC541-7B7A-43D3-8B79-37D633B846F1}">
-                <asvg:svgBlip xmlns:asvg="http://schemas.microsoft.com/office/drawing/2016/SVG/main" xmlns="" r:embed="rId25"/>
+                <asvg:svgBlip xmlns="" xmlns:asvg="http://schemas.microsoft.com/office/drawing/2016/SVG/main" r:embed="rId25"/>
               </a:ext>
             </a:extLst>
           </a:blip>
@@ -21116,13 +23422,12 @@
           <p:cNvPr id="39" name="Straight Connector 38"/>
           <p:cNvCxnSpPr>
             <a:cxnSpLocks/>
-            <a:stCxn id="49" idx="1"/>
           </p:cNvCxnSpPr>
           <p:nvPr/>
         </p:nvCxnSpPr>
         <p:spPr>
           <a:xfrm flipH="1">
-            <a:off x="2725707" y="5490410"/>
+            <a:off x="2725707" y="5502285"/>
             <a:ext cx="2797708" cy="0"/>
           </a:xfrm>
           <a:prstGeom prst="line">
@@ -21304,15 +23609,7 @@
                 <a:ea typeface="メイリオ" panose="020B0604030504040204" pitchFamily="50" charset="-128"/>
                 <a:cs typeface="メイリオ" panose="020B0604030504040204" pitchFamily="50" charset="-128"/>
               </a:rPr>
-              <a:t>プロジェクトをキックオフし、すべての関係組織の窓口担当</a:t>
-            </a:r>
-            <a:r>
-              <a:rPr lang="ja-JP" altLang="en-US" sz="1100" dirty="0" smtClean="0">
-                <a:latin typeface="メイリオ" panose="020B0604030504040204" pitchFamily="50" charset="-128"/>
-                <a:ea typeface="メイリオ" panose="020B0604030504040204" pitchFamily="50" charset="-128"/>
-                <a:cs typeface="メイリオ" panose="020B0604030504040204" pitchFamily="50" charset="-128"/>
-              </a:rPr>
-              <a:t>を紹介し換算に関する詳細情報を伝えます。</a:t>
+              <a:t>プロジェクトをキックオフし、すべての関係組織の窓口担当を紹介し換算に関する詳細情報を伝えます。</a:t>
             </a:r>
             <a:endParaRPr lang="sv-SE" sz="1100" dirty="0">
               <a:latin typeface="メイリオ" panose="020B0604030504040204" pitchFamily="50" charset="-128"/>
@@ -21351,15 +23648,7 @@
                 <a:ea typeface="メイリオ" panose="020B0604030504040204" pitchFamily="50" charset="-128"/>
                 <a:cs typeface="メイリオ" panose="020B0604030504040204" pitchFamily="50" charset="-128"/>
               </a:rPr>
-              <a:t>立ち上げ時招集、</a:t>
-            </a:r>
-            <a:r>
-              <a:rPr lang="ja-JP" altLang="en-US" sz="1200" b="1" dirty="0" smtClean="0">
-                <a:latin typeface="メイリオ" panose="020B0604030504040204" pitchFamily="50" charset="-128"/>
-                <a:ea typeface="メイリオ" panose="020B0604030504040204" pitchFamily="50" charset="-128"/>
-                <a:cs typeface="メイリオ" panose="020B0604030504040204" pitchFamily="50" charset="-128"/>
-              </a:rPr>
-              <a:t>ミーティング</a:t>
+              <a:t>立ち上げ時招集、ミーティング</a:t>
             </a:r>
             <a:endParaRPr lang="sv-SE" sz="1200" b="1" dirty="0">
               <a:latin typeface="メイリオ" panose="020B0604030504040204" pitchFamily="50" charset="-128"/>
@@ -21600,6 +23889,51 @@
               <a:t>レポートの送付</a:t>
             </a:r>
             <a:endParaRPr lang="sv-SE" dirty="0"/>
+          </a:p>
+        </p:txBody>
+      </p:sp>
+      <p:sp>
+        <p:nvSpPr>
+          <p:cNvPr id="51" name="Arc 22"/>
+          <p:cNvSpPr>
+            <a:spLocks noChangeAspect="1"/>
+          </p:cNvSpPr>
+          <p:nvPr/>
+        </p:nvSpPr>
+        <p:spPr>
+          <a:xfrm rot="16200000" flipH="1">
+            <a:off x="2453711" y="4925415"/>
+            <a:ext cx="576000" cy="576000"/>
+          </a:xfrm>
+          <a:prstGeom prst="arc">
+            <a:avLst/>
+          </a:prstGeom>
+          <a:ln w="19050">
+            <a:solidFill>
+              <a:schemeClr val="tx1"/>
+            </a:solidFill>
+          </a:ln>
+        </p:spPr>
+        <p:style>
+          <a:lnRef idx="1">
+            <a:schemeClr val="accent1"/>
+          </a:lnRef>
+          <a:fillRef idx="0">
+            <a:schemeClr val="accent1"/>
+          </a:fillRef>
+          <a:effectRef idx="0">
+            <a:schemeClr val="accent1"/>
+          </a:effectRef>
+          <a:fontRef idx="minor">
+            <a:schemeClr val="tx1"/>
+          </a:fontRef>
+        </p:style>
+        <p:txBody>
+          <a:bodyPr rtlCol="0" anchor="ctr"/>
+          <a:lstStyle/>
+          <a:p>
+            <a:pPr algn="ctr"/>
+            <a:endParaRPr lang="en-US"/>
           </a:p>
         </p:txBody>
       </p:sp>
@@ -21881,7 +24215,7 @@
   <a:extraClrSchemeLst/>
   <a:extLst>
     <a:ext uri="{05A4C25C-085E-4340-85A3-A5531E510DB2}">
-      <thm15:themeFamily xmlns:thm15="http://schemas.microsoft.com/office/thememl/2012/main" xmlns="" name="Office Theme" id="{62F939B6-93AF-4DB8-9C6B-D6C7DFDC589F}" vid="{4A3C46E8-61CC-4603-A589-7422A47A8E4A}"/>
+      <thm15:themeFamily xmlns="" xmlns:thm15="http://schemas.microsoft.com/office/thememl/2012/main" name="Office Theme" id="{62F939B6-93AF-4DB8-9C6B-D6C7DFDC589F}" vid="{4A3C46E8-61CC-4603-A589-7422A47A8E4A}"/>
     </a:ext>
   </a:extLst>
 </a:theme>
@@ -22142,7 +24476,7 @@
   <a:extraClrSchemeLst/>
   <a:extLst>
     <a:ext uri="{05A4C25C-085E-4340-85A3-A5531E510DB2}">
-      <thm15:themeFamily xmlns:thm15="http://schemas.microsoft.com/office/thememl/2012/main" xmlns="" name="Office Theme" id="{62F939B6-93AF-4DB8-9C6B-D6C7DFDC589F}" vid="{4A3C46E8-61CC-4603-A589-7422A47A8E4A}"/>
+      <thm15:themeFamily xmlns="" xmlns:thm15="http://schemas.microsoft.com/office/thememl/2012/main" name="Office Theme" id="{62F939B6-93AF-4DB8-9C6B-D6C7DFDC589F}" vid="{4A3C46E8-61CC-4603-A589-7422A47A8E4A}"/>
     </a:ext>
   </a:extLst>
 </a:theme>
@@ -22403,7 +24737,7 @@
   <a:extraClrSchemeLst/>
   <a:extLst>
     <a:ext uri="{05A4C25C-085E-4340-85A3-A5531E510DB2}">
-      <thm15:themeFamily xmlns:thm15="http://schemas.microsoft.com/office/thememl/2012/main" xmlns="" name="Office Theme" id="{62F939B6-93AF-4DB8-9C6B-D6C7DFDC589F}" vid="{4A3C46E8-61CC-4603-A589-7422A47A8E4A}"/>
+      <thm15:themeFamily xmlns="" xmlns:thm15="http://schemas.microsoft.com/office/thememl/2012/main" name="Office Theme" id="{62F939B6-93AF-4DB8-9C6B-D6C7DFDC589F}" vid="{4A3C46E8-61CC-4603-A589-7422A47A8E4A}"/>
     </a:ext>
   </a:extLst>
 </a:theme>

</xml_diff>